<commit_message>
first complete certified defense.pptx
</commit_message>
<xml_diff>
--- a/certified defense.pptx
+++ b/certified defense.pptx
@@ -16,16 +16,16 @@
     <p:sldId id="275" r:id="rId9"/>
     <p:sldId id="297" r:id="rId10"/>
     <p:sldId id="273" r:id="rId11"/>
-    <p:sldId id="305" r:id="rId12"/>
-    <p:sldId id="306" r:id="rId13"/>
-    <p:sldId id="307" r:id="rId14"/>
-    <p:sldId id="308" r:id="rId15"/>
-    <p:sldId id="309" r:id="rId16"/>
-    <p:sldId id="310" r:id="rId17"/>
-    <p:sldId id="287" r:id="rId18"/>
-    <p:sldId id="288" r:id="rId19"/>
-    <p:sldId id="290" r:id="rId20"/>
-    <p:sldId id="295" r:id="rId21"/>
+    <p:sldId id="317" r:id="rId12"/>
+    <p:sldId id="305" r:id="rId13"/>
+    <p:sldId id="306" r:id="rId14"/>
+    <p:sldId id="307" r:id="rId15"/>
+    <p:sldId id="308" r:id="rId16"/>
+    <p:sldId id="309" r:id="rId17"/>
+    <p:sldId id="310" r:id="rId18"/>
+    <p:sldId id="287" r:id="rId19"/>
+    <p:sldId id="316" r:id="rId20"/>
+    <p:sldId id="288" r:id="rId21"/>
     <p:sldId id="266" r:id="rId22"/>
   </p:sldIdLst>
   <p:sldSz cx="12192000" cy="6858000"/>
@@ -796,196 +796,357 @@
         <p:cNvGrpSpPr/>
         <p:nvPr/>
       </p:nvGrpSpPr>
-      <p:grpSpPr/>
+      <p:grpSpPr>
+        <a:xfrm>
+          <a:off x="0" y="0"/>
+          <a:ext cx="0" cy="0"/>
+          <a:chOff x="0" y="0"/>
+          <a:chExt cx="0" cy="0"/>
+        </a:xfrm>
+      </p:grpSpPr>
       <p:sp>
         <p:nvSpPr>
           <p:cNvPr id="2" name="幻灯片图像占位符 1"/>
-          <p:cNvSpPr/>
-          <p:nvPr>
-            <p:ph type="sldImg" idx="2"/>
+          <p:cNvSpPr>
+            <a:spLocks noGrp="1" noRot="1" noChangeAspect="1"/>
+          </p:cNvSpPr>
+          <p:nvPr>
+            <p:ph type="sldImg"/>
           </p:nvPr>
         </p:nvSpPr>
         <p:spPr/>
       </p:sp>
       <p:sp>
         <p:nvSpPr>
-          <p:cNvPr id="3" name="文本占位符 2"/>
-          <p:cNvSpPr/>
-          <p:nvPr>
-            <p:ph type="body" idx="3"/>
+          <p:cNvPr id="3" name="备注占位符 2"/>
+          <p:cNvSpPr>
+            <a:spLocks noGrp="1"/>
+          </p:cNvSpPr>
+          <p:nvPr>
+            <p:ph type="body" idx="1"/>
           </p:nvPr>
         </p:nvSpPr>
         <p:spPr/>
         <p:txBody>
           <a:bodyPr/>
-          <a:p>
-            <a:r>
-              <a:rPr lang="zh-CN" altLang="en-US"/>
-              <a:t>接下来讲一下我们已经做的实验。</a:t>
-            </a:r>
-            <a:endParaRPr lang="zh-CN" altLang="en-US"/>
-          </a:p>
-          <a:p>
-            <a:endParaRPr lang="zh-CN" altLang="en-US"/>
-          </a:p>
-          <a:p>
-            <a:r>
-              <a:rPr lang="zh-CN" altLang="en-US"/>
-              <a:t>我们暂时固定了</a:t>
-            </a:r>
-            <a:r>
-              <a:rPr lang="en-US" altLang="zh-CN"/>
-              <a:t>patch</a:t>
-            </a:r>
-            <a:r>
-              <a:rPr lang="zh-CN" altLang="en-US"/>
-              <a:t>和</a:t>
-            </a:r>
-            <a:r>
-              <a:rPr lang="en-US" altLang="zh-CN"/>
-              <a:t>indicator</a:t>
-            </a:r>
-            <a:r>
-              <a:rPr lang="zh-CN" altLang="en-US"/>
-              <a:t>的网络数量，并让</a:t>
-            </a:r>
-            <a:r>
-              <a:rPr lang="en-US" altLang="zh-CN"/>
-              <a:t>indicator</a:t>
-            </a:r>
-            <a:r>
-              <a:rPr lang="zh-CN" altLang="en-US"/>
-              <a:t>与</a:t>
-            </a:r>
-            <a:r>
-              <a:rPr lang="en-US" altLang="zh-CN"/>
-              <a:t>patch</a:t>
-            </a:r>
-            <a:r>
-              <a:rPr lang="zh-CN" altLang="en-US"/>
-              <a:t>网络一一对应，每个</a:t>
-            </a:r>
-            <a:r>
-              <a:rPr lang="en-US" altLang="zh-CN"/>
-              <a:t>indicator</a:t>
-            </a:r>
-            <a:r>
-              <a:rPr lang="zh-CN" altLang="en-US"/>
-              <a:t>控制一个</a:t>
-            </a:r>
-            <a:r>
-              <a:rPr lang="en-US" altLang="zh-CN"/>
-              <a:t>patch</a:t>
-            </a:r>
-            <a:r>
-              <a:rPr lang="zh-CN" altLang="en-US"/>
-              <a:t>网络</a:t>
-            </a:r>
-            <a:r>
-              <a:rPr lang="zh-CN" altLang="en-US"/>
-              <a:t>进行修复。</a:t>
-            </a:r>
-            <a:endParaRPr lang="zh-CN" altLang="en-US"/>
-          </a:p>
-          <a:p>
-            <a:endParaRPr lang="zh-CN" altLang="en-US"/>
-          </a:p>
-          <a:p>
-            <a:r>
-              <a:rPr lang="zh-CN" altLang="en-US"/>
-              <a:t>在训练的过程中这些网络是一起训练的，且同时修复多个</a:t>
-            </a:r>
-            <a:r>
-              <a:rPr lang="zh-CN" altLang="en-US"/>
-              <a:t>安全性质。</a:t>
-            </a:r>
-            <a:endParaRPr lang="zh-CN" altLang="en-US"/>
-          </a:p>
-          <a:p>
-            <a:endParaRPr lang="zh-CN" altLang="en-US"/>
-          </a:p>
-          <a:p>
-            <a:r>
-              <a:rPr lang="zh-CN" altLang="en-US"/>
-              <a:t>实验结果如下。可以看出现在的版本成功修复了多个安全性质，准确率也有</a:t>
-            </a:r>
-            <a:r>
-              <a:rPr lang="zh-CN" altLang="en-US"/>
-              <a:t>相应的提升。</a:t>
-            </a:r>
-            <a:endParaRPr lang="zh-CN" altLang="en-US"/>
-          </a:p>
-          <a:p>
-            <a:endParaRPr lang="zh-CN" altLang="en-US"/>
-          </a:p>
-          <a:p>
-            <a:r>
-              <a:rPr lang="zh-CN" altLang="en-US"/>
-              <a:t>但是还有一些很大的不足，比如</a:t>
+          <a:lstStyle/>
+          <a:p>
+            <a:r>
+              <a:rPr lang="zh-CN" altLang="en-US"/>
+              <a:t>一个想法是基于我们组最近的一个增量验证的工作，</a:t>
             </a:r>
             <a:r>
               <a:rPr lang="zh-CN" altLang="en-US">
                 <a:sym typeface="+mn-ea"/>
               </a:rPr>
-              <a:t>训练得到</a:t>
+              <a:t>对</a:t>
             </a:r>
             <a:r>
               <a:rPr lang="en-US" altLang="zh-CN">
                 <a:sym typeface="+mn-ea"/>
               </a:rPr>
-              <a:t>patch</a:t>
+              <a:t>ART</a:t>
             </a:r>
             <a:r>
               <a:rPr lang="zh-CN" altLang="en-US">
                 <a:sym typeface="+mn-ea"/>
               </a:rPr>
-              <a:t>网络参数都是相同的，换句话说，我们训练得到的</a:t>
+              <a:t>框架进行了扩展。这个增量验证</a:t>
+            </a:r>
+            <a:r>
+              <a:rPr lang="zh-CN" altLang="en-US">
+                <a:sym typeface="+mn-ea"/>
+              </a:rPr>
+              <a:t>的工作现在还在投稿</a:t>
+            </a:r>
+            <a:r>
+              <a:rPr lang="zh-CN" altLang="en-US">
+                <a:sym typeface="+mn-ea"/>
+              </a:rPr>
+              <a:t>中。</a:t>
+            </a:r>
+            <a:endParaRPr lang="zh-CN" altLang="en-US">
+              <a:sym typeface="+mn-ea"/>
+            </a:endParaRPr>
+          </a:p>
+          <a:p>
+            <a:endParaRPr lang="zh-CN" altLang="en-US">
+              <a:sym typeface="+mn-ea"/>
+            </a:endParaRPr>
+          </a:p>
+          <a:p>
+            <a:r>
+              <a:rPr lang="zh-CN" altLang="en-US">
+                <a:sym typeface="+mn-ea"/>
+              </a:rPr>
+              <a:t>增量验证的应用情景是假设有一个网络和一个待满足的性质，我们通过已有的基于约束求解</a:t>
             </a:r>
             <a:r>
               <a:rPr lang="en-US" altLang="zh-CN">
                 <a:sym typeface="+mn-ea"/>
               </a:rPr>
-              <a:t>patch</a:t>
+              <a:t>SMT</a:t>
             </a:r>
             <a:r>
               <a:rPr lang="zh-CN" altLang="en-US">
                 <a:sym typeface="+mn-ea"/>
               </a:rPr>
-              <a:t>网络并没有达到修复特定性质的目的。这有可能是因为</a:t>
+              <a:t>的验证工具进行求解，会得到中间结果的搜索树和最后的验证结果。</a:t>
+            </a:r>
+            <a:endParaRPr lang="zh-CN" altLang="en-US">
+              <a:sym typeface="+mn-ea"/>
+            </a:endParaRPr>
+          </a:p>
+          <a:p>
+            <a:endParaRPr lang="zh-CN" altLang="en-US">
+              <a:sym typeface="+mn-ea"/>
+            </a:endParaRPr>
+          </a:p>
+          <a:p>
+            <a:r>
+              <a:rPr lang="zh-CN" altLang="en-US">
+                <a:sym typeface="+mn-ea"/>
+              </a:rPr>
+              <a:t>如果网络因为</a:t>
+            </a:r>
+            <a:r>
+              <a:rPr lang="zh-CN" altLang="en-US">
+                <a:sym typeface="+mn-ea"/>
+              </a:rPr>
+              <a:t>其他性质不满足</a:t>
+            </a:r>
+            <a:r>
+              <a:rPr lang="zh-CN" altLang="en-US">
+                <a:sym typeface="+mn-ea"/>
+              </a:rPr>
+              <a:t>等原因被一些工具修复，导致网络权重发生了变动，我们就需要对网络进行重新验证，判断它是否真的被修复成功，或者修复别的性质影响了这个性质的可满足</a:t>
+            </a:r>
+            <a:r>
+              <a:rPr lang="zh-CN" altLang="en-US">
+                <a:sym typeface="+mn-ea"/>
+              </a:rPr>
+              <a:t>性。</a:t>
+            </a:r>
+            <a:endParaRPr lang="zh-CN" altLang="en-US">
+              <a:sym typeface="+mn-ea"/>
+            </a:endParaRPr>
+          </a:p>
+          <a:p>
+            <a:endParaRPr lang="zh-CN" altLang="en-US">
+              <a:sym typeface="+mn-ea"/>
+            </a:endParaRPr>
+          </a:p>
+          <a:p>
+            <a:r>
+              <a:rPr lang="zh-CN" altLang="en-US">
+                <a:sym typeface="+mn-ea"/>
+              </a:rPr>
+              <a:t>那么这个时候第一次验证的中间结果，也就是搜索树就可以被利用上了。在网络增量的情况利用已有的验证结果辅助验证，就是增量验证问题中要解决的</a:t>
+            </a:r>
+            <a:r>
+              <a:rPr lang="zh-CN" altLang="en-US">
+                <a:sym typeface="+mn-ea"/>
+              </a:rPr>
+              <a:t>问题。</a:t>
+            </a:r>
+            <a:endParaRPr lang="zh-CN" altLang="en-US">
+              <a:sym typeface="+mn-ea"/>
+            </a:endParaRPr>
+          </a:p>
+          <a:p>
+            <a:endParaRPr lang="zh-CN" altLang="en-US">
+              <a:sym typeface="+mn-ea"/>
+            </a:endParaRPr>
+          </a:p>
+          <a:p>
+            <a:r>
+              <a:rPr lang="zh-CN" altLang="en-US">
+                <a:sym typeface="+mn-ea"/>
+              </a:rPr>
+              <a:t>具体来讲，增量验证工具会检查搜索树的叶子节点。对于原先结果是</a:t>
             </a:r>
             <a:r>
               <a:rPr lang="en-US" altLang="zh-CN">
                 <a:sym typeface="+mn-ea"/>
               </a:rPr>
-              <a:t>indicator</a:t>
+              <a:t>sat</a:t>
             </a:r>
             <a:r>
               <a:rPr lang="zh-CN" altLang="en-US">
                 <a:sym typeface="+mn-ea"/>
               </a:rPr>
-              <a:t>不够精确，也有可能是训练的设计不好。</a:t>
+              <a:t>的节点，会通过对变量赋值直接重新判断是否还是</a:t>
             </a:r>
             <a:r>
               <a:rPr lang="en-US" altLang="zh-CN">
                 <a:sym typeface="+mn-ea"/>
               </a:rPr>
-              <a:t> </a:t>
+              <a:t>sat</a:t>
             </a:r>
             <a:r>
               <a:rPr lang="zh-CN" altLang="en-US">
                 <a:sym typeface="+mn-ea"/>
               </a:rPr>
-              <a:t>后面会提到我们</a:t>
+              <a:t>的情况。对于</a:t>
+            </a:r>
+            <a:r>
+              <a:rPr lang="en-US" altLang="zh-CN">
+                <a:sym typeface="+mn-ea"/>
+              </a:rPr>
+              <a:t>unsat</a:t>
             </a:r>
             <a:r>
               <a:rPr lang="zh-CN" altLang="en-US">
                 <a:sym typeface="+mn-ea"/>
               </a:rPr>
-              <a:t>针对这些问题的改进方案。</a:t>
-            </a:r>
-            <a:endParaRPr lang="zh-CN" altLang="en-US"/>
-          </a:p>
-          <a:p>
+              <a:t>的节点，我们会用一些快速的具有可靠性的方法收紧变量的界，如区间传播，或者抽象解释类的方法。接着我们会恢复叶子节点中的一个格局，可以理解为线性规划里的基变量和非基变量以及他们的</a:t>
+            </a:r>
+            <a:r>
+              <a:rPr lang="en-US" altLang="zh-CN">
+                <a:sym typeface="+mn-ea"/>
+              </a:rPr>
+              <a:t>bound</a:t>
+            </a:r>
+            <a:r>
+              <a:rPr lang="zh-CN" altLang="en-US">
+                <a:sym typeface="+mn-ea"/>
+              </a:rPr>
+              <a:t>。接着我们去做验证，如果发现是</a:t>
+            </a:r>
+            <a:r>
+              <a:rPr lang="en-US" altLang="zh-CN">
+                <a:sym typeface="+mn-ea"/>
+              </a:rPr>
+              <a:t>unsat</a:t>
+            </a:r>
+            <a:r>
+              <a:rPr lang="zh-CN" altLang="en-US">
+                <a:sym typeface="+mn-ea"/>
+              </a:rPr>
+              <a:t>的情况，我们会直接返回</a:t>
+            </a:r>
+            <a:r>
+              <a:rPr lang="en-US" altLang="zh-CN">
+                <a:sym typeface="+mn-ea"/>
+              </a:rPr>
+              <a:t>unsat</a:t>
+            </a:r>
+            <a:r>
+              <a:rPr lang="zh-CN" altLang="en-US">
+                <a:sym typeface="+mn-ea"/>
+              </a:rPr>
+              <a:t>，如果当前还不能验证结果，我们会调用</a:t>
+            </a:r>
+            <a:r>
+              <a:rPr lang="en-US" altLang="zh-CN">
+                <a:sym typeface="+mn-ea"/>
+              </a:rPr>
+              <a:t>marabou</a:t>
+            </a:r>
+            <a:r>
+              <a:rPr lang="zh-CN" altLang="en-US">
+                <a:sym typeface="+mn-ea"/>
+              </a:rPr>
+              <a:t>接着进行</a:t>
+            </a:r>
+            <a:r>
+              <a:rPr lang="zh-CN" altLang="en-US">
+                <a:sym typeface="+mn-ea"/>
+              </a:rPr>
+              <a:t>求解。</a:t>
+            </a:r>
+            <a:endParaRPr lang="zh-CN" altLang="en-US">
+              <a:sym typeface="+mn-ea"/>
+            </a:endParaRPr>
+          </a:p>
+          <a:p>
+            <a:endParaRPr lang="zh-CN" altLang="en-US">
+              <a:sym typeface="+mn-ea"/>
+            </a:endParaRPr>
+          </a:p>
+          <a:p>
+            <a:r>
+              <a:rPr lang="zh-CN" altLang="en-US">
+                <a:sym typeface="+mn-ea"/>
+              </a:rPr>
+              <a:t>与之配套，我们提出了一个基于</a:t>
+            </a:r>
+            <a:r>
+              <a:rPr lang="en-US" altLang="zh-CN">
+                <a:sym typeface="+mn-ea"/>
+              </a:rPr>
+              <a:t>ART</a:t>
+            </a:r>
+            <a:r>
+              <a:rPr lang="zh-CN" altLang="en-US">
+                <a:sym typeface="+mn-ea"/>
+              </a:rPr>
+              <a:t>的修复框架，可以和我们的增量验证工具去结合达到快速验证网络的目的。这个框架的改动并不难，就是在</a:t>
+            </a:r>
+            <a:r>
+              <a:rPr lang="en-US" altLang="zh-CN">
+                <a:sym typeface="+mn-ea"/>
+              </a:rPr>
+              <a:t>ART</a:t>
+            </a:r>
+            <a:r>
+              <a:rPr lang="zh-CN" altLang="en-US">
+                <a:sym typeface="+mn-ea"/>
+              </a:rPr>
+              <a:t>的训练过中对更新的权重进行裁剪，控制它权重的变动幅度，以配合我们的增量验证工具进行快速</a:t>
+            </a:r>
+            <a:r>
+              <a:rPr lang="zh-CN" altLang="en-US">
+                <a:sym typeface="+mn-ea"/>
+              </a:rPr>
+              <a:t>验证。</a:t>
+            </a:r>
+            <a:endParaRPr lang="zh-CN" altLang="en-US">
+              <a:sym typeface="+mn-ea"/>
+            </a:endParaRPr>
+          </a:p>
+          <a:p>
+            <a:endParaRPr lang="zh-CN" altLang="en-US">
+              <a:sym typeface="+mn-ea"/>
+            </a:endParaRPr>
+          </a:p>
+          <a:p>
+            <a:r>
+              <a:rPr lang="zh-CN" altLang="en-US">
+                <a:sym typeface="+mn-ea"/>
+              </a:rPr>
+              <a:t>这个想法在实验的过程中发现还有一些缺陷，比如网络一直不能收敛到满足性质，后面计划再考虑一些方法去改进</a:t>
+            </a:r>
+            <a:r>
+              <a:rPr lang="zh-CN" altLang="en-US">
+                <a:sym typeface="+mn-ea"/>
+              </a:rPr>
+              <a:t>它。</a:t>
+            </a:r>
+            <a:endParaRPr lang="zh-CN" altLang="en-US">
+              <a:sym typeface="+mn-ea"/>
+            </a:endParaRPr>
+          </a:p>
+        </p:txBody>
+      </p:sp>
+      <p:sp>
+        <p:nvSpPr>
+          <p:cNvPr id="4" name="灯片编号占位符 3"/>
+          <p:cNvSpPr>
+            <a:spLocks noGrp="1"/>
+          </p:cNvSpPr>
+          <p:nvPr>
+            <p:ph type="sldNum" sz="quarter" idx="10"/>
+          </p:nvPr>
+        </p:nvSpPr>
+        <p:spPr/>
+        <p:txBody>
+          <a:bodyPr/>
+          <a:lstStyle/>
+          <a:p>
+            <a:fld id="{5FD4487E-253C-4F2A-AD3B-D7DF4058A670}" type="slidenum">
+              <a:rPr lang="zh-CN" altLang="en-US" smtClean="0"/>
+            </a:fld>
             <a:endParaRPr lang="zh-CN" altLang="en-US"/>
           </a:p>
         </p:txBody>
@@ -1032,11 +1193,7 @@
           <a:p>
             <a:r>
               <a:rPr lang="zh-CN" altLang="en-US"/>
-              <a:t>我们还做了关于公平性质的修复。首先需要对数据进行预处理，将数据一一编码成性质。每个性质都有一个敏感属性，在敏感属性上，我们的约束是全区间，也就是所有可以取到的值；在非敏感属性上，我们约束的上下界是相等的，即原本数据的</a:t>
-            </a:r>
-            <a:r>
-              <a:rPr lang="zh-CN" altLang="en-US"/>
-              <a:t>值。</a:t>
+              <a:t>接下来讲一下我们已经做的实验。</a:t>
             </a:r>
             <a:endParaRPr lang="zh-CN" altLang="en-US"/>
           </a:p>
@@ -1046,7 +1203,15 @@
           <a:p>
             <a:r>
               <a:rPr lang="zh-CN" altLang="en-US"/>
-              <a:t>在公平性实验中，我们修复所有的性质，</a:t>
+              <a:t>我们暂时固定了</a:t>
+            </a:r>
+            <a:r>
+              <a:rPr lang="en-US" altLang="zh-CN"/>
+              <a:t>patch</a:t>
+            </a:r>
+            <a:r>
+              <a:rPr lang="zh-CN" altLang="en-US"/>
+              <a:t>和</a:t>
             </a:r>
             <a:r>
               <a:rPr lang="en-US" altLang="zh-CN"/>
@@ -1054,7 +1219,15 @@
             </a:r>
             <a:r>
               <a:rPr lang="zh-CN" altLang="en-US"/>
-              <a:t>和</a:t>
+              <a:t>的网络数量，并让</a:t>
+            </a:r>
+            <a:r>
+              <a:rPr lang="en-US" altLang="zh-CN"/>
+              <a:t>indicator</a:t>
+            </a:r>
+            <a:r>
+              <a:rPr lang="zh-CN" altLang="en-US"/>
+              <a:t>与</a:t>
             </a:r>
             <a:r>
               <a:rPr lang="en-US" altLang="zh-CN"/>
@@ -1062,7 +1235,27 @@
             </a:r>
             <a:r>
               <a:rPr lang="zh-CN" altLang="en-US"/>
-              <a:t>的设置和安全性实验相同。</a:t>
+              <a:t>网络一一对应，每个</a:t>
+            </a:r>
+            <a:r>
+              <a:rPr lang="en-US" altLang="zh-CN"/>
+              <a:t>indicator</a:t>
+            </a:r>
+            <a:r>
+              <a:rPr lang="zh-CN" altLang="en-US"/>
+              <a:t>控制一个</a:t>
+            </a:r>
+            <a:r>
+              <a:rPr lang="en-US" altLang="zh-CN"/>
+              <a:t>patch</a:t>
+            </a:r>
+            <a:r>
+              <a:rPr lang="zh-CN" altLang="en-US"/>
+              <a:t>网络</a:t>
+            </a:r>
+            <a:r>
+              <a:rPr lang="zh-CN" altLang="en-US"/>
+              <a:t>进行修复。</a:t>
             </a:r>
             <a:endParaRPr lang="zh-CN" altLang="en-US"/>
           </a:p>
@@ -1072,12 +1265,99 @@
           <a:p>
             <a:r>
               <a:rPr lang="zh-CN" altLang="en-US"/>
-              <a:t>我们一共做了两组实验，训练集和测试集相同和不同的情况我们</a:t>
-            </a:r>
-            <a:r>
-              <a:rPr lang="zh-CN" altLang="en-US"/>
-              <a:t>都测了一下。</a:t>
-            </a:r>
+              <a:t>在训练的过程中这些网络是一起训练的，且同时修复多个</a:t>
+            </a:r>
+            <a:r>
+              <a:rPr lang="zh-CN" altLang="en-US"/>
+              <a:t>安全性质。</a:t>
+            </a:r>
+            <a:endParaRPr lang="zh-CN" altLang="en-US"/>
+          </a:p>
+          <a:p>
+            <a:endParaRPr lang="zh-CN" altLang="en-US"/>
+          </a:p>
+          <a:p>
+            <a:r>
+              <a:rPr lang="zh-CN" altLang="en-US"/>
+              <a:t>实验结果如下。可以看出现在的版本成功修复了多个安全性质，准确率也有</a:t>
+            </a:r>
+            <a:r>
+              <a:rPr lang="zh-CN" altLang="en-US"/>
+              <a:t>相应的提升。</a:t>
+            </a:r>
+            <a:endParaRPr lang="zh-CN" altLang="en-US"/>
+          </a:p>
+          <a:p>
+            <a:endParaRPr lang="zh-CN" altLang="en-US"/>
+          </a:p>
+          <a:p>
+            <a:r>
+              <a:rPr lang="zh-CN" altLang="en-US"/>
+              <a:t>但是还有一些很大的不足，比如</a:t>
+            </a:r>
+            <a:r>
+              <a:rPr lang="zh-CN" altLang="en-US">
+                <a:sym typeface="+mn-ea"/>
+              </a:rPr>
+              <a:t>训练得到</a:t>
+            </a:r>
+            <a:r>
+              <a:rPr lang="en-US" altLang="zh-CN">
+                <a:sym typeface="+mn-ea"/>
+              </a:rPr>
+              <a:t>patch</a:t>
+            </a:r>
+            <a:r>
+              <a:rPr lang="zh-CN" altLang="en-US">
+                <a:sym typeface="+mn-ea"/>
+              </a:rPr>
+              <a:t>网络参数都是相同的，换句话说，我们训练得到的</a:t>
+            </a:r>
+            <a:r>
+              <a:rPr lang="en-US" altLang="zh-CN">
+                <a:sym typeface="+mn-ea"/>
+              </a:rPr>
+              <a:t>patch</a:t>
+            </a:r>
+            <a:r>
+              <a:rPr lang="zh-CN" altLang="en-US">
+                <a:sym typeface="+mn-ea"/>
+              </a:rPr>
+              <a:t>网络并没有达到修复特定性质的目的。这有可能是因为</a:t>
+            </a:r>
+            <a:r>
+              <a:rPr lang="en-US" altLang="zh-CN">
+                <a:sym typeface="+mn-ea"/>
+              </a:rPr>
+              <a:t>indicator</a:t>
+            </a:r>
+            <a:r>
+              <a:rPr lang="zh-CN" altLang="en-US">
+                <a:sym typeface="+mn-ea"/>
+              </a:rPr>
+              <a:t>不够精确，也有可能是训练的设计不好。</a:t>
+            </a:r>
+            <a:r>
+              <a:rPr lang="en-US" altLang="zh-CN">
+                <a:sym typeface="+mn-ea"/>
+              </a:rPr>
+              <a:t> </a:t>
+            </a:r>
+            <a:r>
+              <a:rPr lang="zh-CN" altLang="en-US">
+                <a:sym typeface="+mn-ea"/>
+              </a:rPr>
+              <a:t>后面会提到我们</a:t>
+            </a:r>
+            <a:r>
+              <a:rPr lang="zh-CN" altLang="en-US">
+                <a:sym typeface="+mn-ea"/>
+              </a:rPr>
+              <a:t>针对这些问题的改进方案。</a:t>
+            </a:r>
+            <a:endParaRPr lang="zh-CN" altLang="en-US"/>
+          </a:p>
+          <a:p>
             <a:endParaRPr lang="zh-CN" altLang="en-US"/>
           </a:p>
         </p:txBody>
@@ -1122,22 +1402,53 @@
         <p:txBody>
           <a:bodyPr/>
           <a:p>
+            <a:r>
+              <a:rPr lang="zh-CN" altLang="en-US"/>
+              <a:t>我们还做了关于公平性质的修复。首先需要对数据进行预处理，将数据一一编码成性质。每个性质都有一个敏感属性，在敏感属性上，我们的约束是全区间，也就是所有可以取到的值；在非敏感属性上，我们约束的上下界是相等的，即原本数据的</a:t>
+            </a:r>
+            <a:r>
+              <a:rPr lang="zh-CN" altLang="en-US"/>
+              <a:t>值。</a:t>
+            </a:r>
             <a:endParaRPr lang="zh-CN" altLang="en-US"/>
           </a:p>
           <a:p>
-            <a:r>
-              <a:rPr lang="zh-CN" altLang="en-US"/>
-              <a:t>训练集和验证集不同时，效果不好的原因：数据量太少，测试集和验证集分布完全不同，或者说是权重可行解和泛化的可行解域差距很大。后面考虑用数据增强的方法去做</a:t>
-            </a:r>
             <a:endParaRPr lang="zh-CN" altLang="en-US"/>
           </a:p>
           <a:p>
+            <a:r>
+              <a:rPr lang="zh-CN" altLang="en-US"/>
+              <a:t>在公平性实验中，我们修复所有的性质，</a:t>
+            </a:r>
+            <a:r>
+              <a:rPr lang="en-US" altLang="zh-CN"/>
+              <a:t>indicator</a:t>
+            </a:r>
+            <a:r>
+              <a:rPr lang="zh-CN" altLang="en-US"/>
+              <a:t>和</a:t>
+            </a:r>
+            <a:r>
+              <a:rPr lang="en-US" altLang="zh-CN"/>
+              <a:t>patch</a:t>
+            </a:r>
+            <a:r>
+              <a:rPr lang="zh-CN" altLang="en-US"/>
+              <a:t>的设置和安全性实验相同。</a:t>
+            </a:r>
             <a:endParaRPr lang="zh-CN" altLang="en-US"/>
           </a:p>
           <a:p>
-            <a:r>
-              <a:rPr lang="zh-CN" altLang="en-US"/>
-              <a:t>公平性质的sensitive属性编码时要求整个子空间都要满足，且公平性质是若干数据，即若干个性质对应的可行解域的交，这导致可行解域很小</a:t>
+            <a:endParaRPr lang="zh-CN" altLang="en-US"/>
+          </a:p>
+          <a:p>
+            <a:r>
+              <a:rPr lang="zh-CN" altLang="en-US"/>
+              <a:t>我们一共做了两组实验，训练集和测试集相同和不同的情况我们</a:t>
+            </a:r>
+            <a:r>
+              <a:rPr lang="zh-CN" altLang="en-US"/>
+              <a:t>都测了一下。</a:t>
             </a:r>
             <a:endParaRPr lang="zh-CN" altLang="en-US"/>
           </a:p>
@@ -1152,152 +1463,6 @@
 </file>
 
 <file path=ppt/notesSlides/notesSlide13.xml><?xml version="1.0" encoding="utf-8"?>
-<p:notes xmlns:a="http://schemas.openxmlformats.org/drawingml/2006/main" xmlns:r="http://schemas.openxmlformats.org/officeDocument/2006/relationships" xmlns:p="http://schemas.openxmlformats.org/presentationml/2006/main">
-  <p:cSld>
-    <p:spTree>
-      <p:nvGrpSpPr>
-        <p:cNvPr id="1" name=""/>
-        <p:cNvGrpSpPr/>
-        <p:nvPr/>
-      </p:nvGrpSpPr>
-      <p:grpSpPr/>
-      <p:sp>
-        <p:nvSpPr>
-          <p:cNvPr id="2" name="幻灯片图像占位符 1"/>
-          <p:cNvSpPr/>
-          <p:nvPr>
-            <p:ph type="sldImg" idx="2"/>
-          </p:nvPr>
-        </p:nvSpPr>
-        <p:spPr/>
-      </p:sp>
-      <p:sp>
-        <p:nvSpPr>
-          <p:cNvPr id="3" name="文本占位符 2"/>
-          <p:cNvSpPr/>
-          <p:nvPr>
-            <p:ph type="body" idx="3"/>
-          </p:nvPr>
-        </p:nvSpPr>
-        <p:spPr/>
-        <p:txBody>
-          <a:bodyPr/>
-          <a:p>
-            <a:r>
-              <a:rPr lang="zh-CN" altLang="en-US"/>
-              <a:t>我们的改进方案呢，</a:t>
-            </a:r>
-            <a:r>
-              <a:rPr lang="zh-CN" altLang="en-US"/>
-              <a:t>就是对</a:t>
-            </a:r>
-            <a:r>
-              <a:rPr lang="en-US" altLang="zh-CN"/>
-              <a:t>indicator</a:t>
-            </a:r>
-            <a:r>
-              <a:rPr lang="zh-CN" altLang="en-US"/>
-              <a:t>进行预训练，使得它对输入区间有识别能力，可以判断这个输入区间是在哪个性质中的</a:t>
-            </a:r>
-            <a:r>
-              <a:rPr lang="zh-CN" altLang="en-US"/>
-              <a:t>约束</a:t>
-            </a:r>
-            <a:endParaRPr lang="zh-CN" altLang="en-US"/>
-          </a:p>
-          <a:p>
-            <a:endParaRPr lang="zh-CN" altLang="en-US"/>
-          </a:p>
-          <a:p>
-            <a:r>
-              <a:rPr lang="zh-CN" altLang="en-US"/>
-              <a:t>像对于安全性质，我们可以先对输入区间进行分割，使得精度提高。将这些区间作为训练集放入</a:t>
-            </a:r>
-            <a:r>
-              <a:rPr lang="en-US" altLang="zh-CN"/>
-              <a:t>indicator</a:t>
-            </a:r>
-            <a:r>
-              <a:rPr lang="zh-CN" altLang="en-US"/>
-              <a:t>中进行训练，使得</a:t>
-            </a:r>
-            <a:r>
-              <a:rPr lang="en-US" altLang="zh-CN"/>
-              <a:t>indicator</a:t>
-            </a:r>
-            <a:r>
-              <a:rPr lang="zh-CN" altLang="en-US"/>
-              <a:t>对于输入区间和性质的相关性有一个较好的</a:t>
-            </a:r>
-            <a:r>
-              <a:rPr lang="zh-CN" altLang="en-US"/>
-              <a:t>判定。</a:t>
-            </a:r>
-            <a:endParaRPr lang="zh-CN" altLang="en-US"/>
-          </a:p>
-          <a:p>
-            <a:endParaRPr lang="en-US" altLang="zh-CN"/>
-          </a:p>
-          <a:p>
-            <a:r>
-              <a:rPr lang="zh-CN" altLang="en-US"/>
-              <a:t>有了预训练的</a:t>
-            </a:r>
-            <a:r>
-              <a:rPr lang="en-US" altLang="zh-CN"/>
-              <a:t>indicator</a:t>
-            </a:r>
-            <a:r>
-              <a:rPr lang="zh-CN" altLang="en-US"/>
-              <a:t>以后，我们就可以将它和</a:t>
-            </a:r>
-            <a:r>
-              <a:rPr lang="en-US" altLang="zh-CN"/>
-              <a:t>patch</a:t>
-            </a:r>
-            <a:r>
-              <a:rPr lang="zh-CN" altLang="en-US"/>
-              <a:t>相结合，去进行修复。结合的方法就是用下面的公式。在这个公式，当支持网络的输出较小时，</a:t>
-            </a:r>
-            <a:r>
-              <a:rPr lang="en-US" altLang="zh-CN"/>
-              <a:t>ha</a:t>
-            </a:r>
-            <a:r>
-              <a:rPr lang="zh-CN" altLang="en-US"/>
-              <a:t>会更偏向于</a:t>
-            </a:r>
-            <a:r>
-              <a:rPr lang="en-US" altLang="zh-CN"/>
-              <a:t>0</a:t>
-            </a:r>
-            <a:r>
-              <a:rPr lang="zh-CN" altLang="en-US"/>
-              <a:t>。</a:t>
-            </a:r>
-            <a:endParaRPr lang="zh-CN" altLang="en-US"/>
-          </a:p>
-          <a:p>
-            <a:endParaRPr lang="zh-CN" altLang="en-US"/>
-          </a:p>
-          <a:p>
-            <a:r>
-              <a:rPr lang="zh-CN" altLang="en-US"/>
-              <a:t>最后再把结合过后的修复部件和原网络结合，即两个部分的输出相加即可。</a:t>
-            </a:r>
-            <a:endParaRPr lang="en-US" altLang="zh-CN"/>
-          </a:p>
-        </p:txBody>
-      </p:sp>
-    </p:spTree>
-  </p:cSld>
-  <p:clrMapOvr>
-    <a:masterClrMapping/>
-  </p:clrMapOvr>
-</p:notes>
-</file>
-
-<file path=ppt/notesSlides/notesSlide14.xml><?xml version="1.0" encoding="utf-8"?>
 <p:notes xmlns:a="http://schemas.openxmlformats.org/drawingml/2006/main" xmlns:r="http://schemas.openxmlformats.org/officeDocument/2006/relationships" xmlns:p="http://schemas.openxmlformats.org/presentationml/2006/main">
   <p:cSld>
     <p:spTree>
@@ -6271,6 +6436,124 @@
         </p:nvSpPr>
         <p:spPr>
           <a:xfrm>
+            <a:off x="407035" y="5713095"/>
+            <a:ext cx="11378565" cy="686435"/>
+          </a:xfrm>
+          <a:prstGeom prst="rect">
+            <a:avLst/>
+          </a:prstGeom>
+          <a:noFill/>
+        </p:spPr>
+        <p:txBody>
+          <a:bodyPr wrap="square" rtlCol="0">
+            <a:noAutofit/>
+          </a:bodyPr>
+          <a:p>
+            <a:r>
+              <a:rPr sz="1600"/>
+              <a:t>N. Jovanovi ́c, M. Balunovi ́c, M. Baader, and M. Vechev, "On the paradox of certified training," in Transactions on Machine Learning Research, 2022.</a:t>
+            </a:r>
+            <a:endParaRPr sz="1600"/>
+          </a:p>
+        </p:txBody>
+      </p:sp>
+      <p:pic>
+        <p:nvPicPr>
+          <p:cNvPr id="4" name="图片 3"/>
+          <p:cNvPicPr>
+            <a:picLocks noChangeAspect="1"/>
+          </p:cNvPicPr>
+          <p:nvPr>
+            <p:custDataLst>
+              <p:tags r:id="rId2"/>
+            </p:custDataLst>
+          </p:nvPr>
+        </p:nvPicPr>
+        <p:blipFill>
+          <a:blip r:embed="rId3"/>
+          <a:stretch>
+            <a:fillRect/>
+          </a:stretch>
+        </p:blipFill>
+        <p:spPr>
+          <a:xfrm>
+            <a:off x="1036320" y="1408430"/>
+            <a:ext cx="10191115" cy="4114165"/>
+          </a:xfrm>
+          <a:prstGeom prst="rect">
+            <a:avLst/>
+          </a:prstGeom>
+        </p:spPr>
+      </p:pic>
+    </p:spTree>
+  </p:cSld>
+  <p:clrMapOvr>
+    <a:masterClrMapping/>
+  </p:clrMapOvr>
+</p:sld>
+</file>
+
+<file path=ppt/slides/slide11.xml><?xml version="1.0" encoding="utf-8"?>
+<p:sld xmlns:a="http://schemas.openxmlformats.org/drawingml/2006/main" xmlns:r="http://schemas.openxmlformats.org/officeDocument/2006/relationships" xmlns:p="http://schemas.openxmlformats.org/presentationml/2006/main">
+  <p:cSld>
+    <p:spTree>
+      <p:nvGrpSpPr>
+        <p:cNvPr id="1" name=""/>
+        <p:cNvGrpSpPr/>
+        <p:nvPr/>
+      </p:nvGrpSpPr>
+      <p:grpSpPr>
+        <a:xfrm>
+          <a:off x="0" y="0"/>
+          <a:ext cx="0" cy="0"/>
+          <a:chOff x="0" y="0"/>
+          <a:chExt cx="0" cy="0"/>
+        </a:xfrm>
+      </p:grpSpPr>
+      <p:sp>
+        <p:nvSpPr>
+          <p:cNvPr id="2" name="标题 1"/>
+          <p:cNvSpPr>
+            <a:spLocks noGrp="1"/>
+          </p:cNvSpPr>
+          <p:nvPr>
+            <p:ph type="title"/>
+          </p:nvPr>
+        </p:nvSpPr>
+        <p:spPr>
+          <a:xfrm>
+            <a:off x="838200" y="0"/>
+            <a:ext cx="10515600" cy="1021543"/>
+          </a:xfrm>
+        </p:spPr>
+        <p:txBody>
+          <a:bodyPr/>
+          <a:lstStyle/>
+          <a:p>
+            <a:r>
+              <a:rPr lang="en-US" altLang="zh-CN" b="0" dirty="0"/>
+              <a:t>Continuity and S</a:t>
+            </a:r>
+            <a:r>
+              <a:rPr lang="en-US" altLang="zh-CN" b="0" dirty="0"/>
+              <a:t>ensitivity</a:t>
+            </a:r>
+            <a:endParaRPr lang="en-US" altLang="zh-CN" b="0" dirty="0"/>
+          </a:p>
+        </p:txBody>
+      </p:sp>
+      <p:sp>
+        <p:nvSpPr>
+          <p:cNvPr id="11" name="文本框 10"/>
+          <p:cNvSpPr txBox="1"/>
+          <p:nvPr>
+            <p:custDataLst>
+              <p:tags r:id="rId1"/>
+            </p:custDataLst>
+          </p:nvPr>
+        </p:nvSpPr>
+        <p:spPr>
+          <a:xfrm>
             <a:off x="521335" y="5696585"/>
             <a:ext cx="11378565" cy="686435"/>
           </a:xfrm>
@@ -6332,7 +6615,7 @@
 </p:sld>
 </file>
 
-<file path=ppt/slides/slide11.xml><?xml version="1.0" encoding="utf-8"?>
+<file path=ppt/slides/slide12.xml><?xml version="1.0" encoding="utf-8"?>
 <p:sld xmlns:a="http://schemas.openxmlformats.org/drawingml/2006/main" xmlns:r="http://schemas.openxmlformats.org/officeDocument/2006/relationships" xmlns:p="http://schemas.openxmlformats.org/presentationml/2006/main">
   <p:cSld>
     <p:spTree>
@@ -6435,7 +6718,7 @@
 </p:sld>
 </file>
 
-<file path=ppt/slides/slide12.xml><?xml version="1.0" encoding="utf-8"?>
+<file path=ppt/slides/slide13.xml><?xml version="1.0" encoding="utf-8"?>
 <p:sld xmlns:a="http://schemas.openxmlformats.org/drawingml/2006/main" xmlns:r="http://schemas.openxmlformats.org/officeDocument/2006/relationships" xmlns:p="http://schemas.openxmlformats.org/presentationml/2006/main">
   <p:cSld>
     <p:spTree>
@@ -6566,7 +6849,7 @@
 </p:sld>
 </file>
 
-<file path=ppt/slides/slide13.xml><?xml version="1.0" encoding="utf-8"?>
+<file path=ppt/slides/slide14.xml><?xml version="1.0" encoding="utf-8"?>
 <p:sld xmlns:a="http://schemas.openxmlformats.org/drawingml/2006/main" xmlns:r="http://schemas.openxmlformats.org/officeDocument/2006/relationships" xmlns:p="http://schemas.openxmlformats.org/presentationml/2006/main">
   <p:cSld>
     <p:spTree>
@@ -6786,343 +7069,6 @@
               <a:t>)</a:t>
             </a:r>
             <a:endParaRPr lang="en-US" altLang="zh-CN"/>
-          </a:p>
-        </p:txBody>
-      </p:sp>
-    </p:spTree>
-  </p:cSld>
-  <p:clrMapOvr>
-    <a:masterClrMapping/>
-  </p:clrMapOvr>
-</p:sld>
-</file>
-
-<file path=ppt/slides/slide14.xml><?xml version="1.0" encoding="utf-8"?>
-<p:sld xmlns:a="http://schemas.openxmlformats.org/drawingml/2006/main" xmlns:r="http://schemas.openxmlformats.org/officeDocument/2006/relationships" xmlns:p="http://schemas.openxmlformats.org/presentationml/2006/main">
-  <p:cSld>
-    <p:spTree>
-      <p:nvGrpSpPr>
-        <p:cNvPr id="1" name=""/>
-        <p:cNvGrpSpPr/>
-        <p:nvPr/>
-      </p:nvGrpSpPr>
-      <p:grpSpPr/>
-      <p:sp>
-        <p:nvSpPr>
-          <p:cNvPr id="2" name="标题 1"/>
-          <p:cNvSpPr>
-            <a:spLocks noGrp="1"/>
-          </p:cNvSpPr>
-          <p:nvPr>
-            <p:ph type="title"/>
-          </p:nvPr>
-        </p:nvSpPr>
-        <p:spPr/>
-        <p:txBody>
-          <a:bodyPr>
-            <a:normAutofit/>
-          </a:bodyPr>
-          <a:p>
-            <a:r>
-              <a:rPr altLang="zh-CN" sz="2665">
-                <a:sym typeface="+mn-ea"/>
-              </a:rPr>
-              <a:t>Towards Stable and Efficient Training of Verifiably Robust Neural Networks</a:t>
-            </a:r>
-            <a:endParaRPr lang="zh-CN" altLang="en-US" sz="2665"/>
-          </a:p>
-        </p:txBody>
-      </p:sp>
-      <p:sp>
-        <p:nvSpPr>
-          <p:cNvPr id="5" name="文本框 4"/>
-          <p:cNvSpPr txBox="1"/>
-          <p:nvPr/>
-        </p:nvSpPr>
-        <p:spPr>
-          <a:xfrm>
-            <a:off x="485140" y="1816735"/>
-            <a:ext cx="10507345" cy="1753235"/>
-          </a:xfrm>
-          <a:prstGeom prst="rect">
-            <a:avLst/>
-          </a:prstGeom>
-          <a:noFill/>
-        </p:spPr>
-        <p:txBody>
-          <a:bodyPr wrap="square" rtlCol="0">
-            <a:spAutoFit/>
-          </a:bodyPr>
-          <a:p>
-            <a:pPr indent="0" fontAlgn="auto">
-              <a:lnSpc>
-                <a:spcPct val="150000"/>
-              </a:lnSpc>
-            </a:pPr>
-            <a:r>
-              <a:rPr lang="en-US" altLang="zh-CN" b="1"/>
-              <a:t>Key Insight:</a:t>
-            </a:r>
-            <a:r>
-              <a:rPr lang="en-US" altLang="zh-CN"/>
-              <a:t> </a:t>
-            </a:r>
-            <a:r>
-              <a:rPr lang="zh-CN" altLang="en-US"/>
-              <a:t>将</a:t>
-            </a:r>
-            <a:r>
-              <a:rPr lang="en-US" altLang="zh-CN"/>
-              <a:t>natural loss</a:t>
-            </a:r>
-            <a:r>
-              <a:rPr lang="zh-CN" altLang="en-US"/>
-              <a:t>，</a:t>
-            </a:r>
-            <a:r>
-              <a:rPr lang="en-US" altLang="zh-CN"/>
-              <a:t>IBP bound </a:t>
-            </a:r>
-            <a:r>
-              <a:rPr lang="zh-CN" altLang="en-US"/>
-              <a:t>和</a:t>
-            </a:r>
-            <a:r>
-              <a:rPr lang="en-US" altLang="zh-CN"/>
-              <a:t> crown-IBP bound </a:t>
-            </a:r>
-            <a:r>
-              <a:rPr lang="zh-CN" altLang="en-US"/>
-              <a:t>组合在一起进行训练</a:t>
-            </a:r>
-            <a:endParaRPr lang="en-US" altLang="zh-CN"/>
-          </a:p>
-          <a:p>
-            <a:pPr indent="0" fontAlgn="auto">
-              <a:lnSpc>
-                <a:spcPct val="150000"/>
-              </a:lnSpc>
-            </a:pPr>
-            <a:r>
-              <a:rPr lang="zh-CN" altLang="en-US"/>
-              <a:t>（</a:t>
-            </a:r>
-            <a:r>
-              <a:rPr lang="en-US" altLang="zh-CN"/>
-              <a:t>1</a:t>
-            </a:r>
-            <a:r>
-              <a:rPr lang="zh-CN" altLang="en-US"/>
-              <a:t>）</a:t>
-            </a:r>
-            <a:r>
-              <a:rPr lang="en-US" altLang="zh-CN"/>
-              <a:t>比 IBP 更通用，</a:t>
-            </a:r>
-            <a:r>
-              <a:rPr lang="zh-CN" altLang="en-US"/>
-              <a:t>可根据</a:t>
-            </a:r>
-            <a:r>
-              <a:rPr lang="en-US" altLang="zh-CN"/>
-              <a:t>radius</a:t>
-            </a:r>
-            <a:r>
-              <a:rPr lang="zh-CN" altLang="en-US"/>
-              <a:t>灵活结合</a:t>
-            </a:r>
-            <a:r>
-              <a:rPr lang="en-US" altLang="zh-CN"/>
-              <a:t>IBP</a:t>
-            </a:r>
-            <a:r>
-              <a:rPr lang="zh-CN" altLang="en-US"/>
-              <a:t>和凸松弛方法</a:t>
-            </a:r>
-            <a:r>
-              <a:rPr lang="en-US" altLang="zh-CN"/>
-              <a:t>.</a:t>
-            </a:r>
-            <a:endParaRPr lang="zh-CN" altLang="en-US"/>
-          </a:p>
-          <a:p>
-            <a:pPr indent="0" fontAlgn="auto">
-              <a:lnSpc>
-                <a:spcPct val="150000"/>
-              </a:lnSpc>
-            </a:pPr>
-            <a:r>
-              <a:rPr lang="zh-CN" altLang="en-US"/>
-              <a:t>（</a:t>
-            </a:r>
-            <a:r>
-              <a:rPr lang="en-US" altLang="zh-CN"/>
-              <a:t>2</a:t>
-            </a:r>
-            <a:r>
-              <a:rPr lang="zh-CN" altLang="en-US"/>
-              <a:t>）先用更紧的界保证初始训练稳定</a:t>
-            </a:r>
-            <a:r>
-              <a:rPr lang="en-US" altLang="zh-CN"/>
-              <a:t>(</a:t>
-            </a:r>
-            <a:r>
-              <a:rPr lang="en-US" altLang="zh-CN">
-                <a:sym typeface="+mn-ea"/>
-              </a:rPr>
-              <a:t> β = 1</a:t>
-            </a:r>
-            <a:r>
-              <a:rPr lang="en-US" altLang="zh-CN"/>
-              <a:t>), </a:t>
-            </a:r>
-            <a:r>
-              <a:rPr lang="zh-CN" altLang="en-US"/>
-              <a:t>后逐渐</a:t>
-            </a:r>
-            <a:r>
-              <a:rPr lang="en-US" altLang="zh-CN"/>
-              <a:t>将 β 降低到 0，</a:t>
-            </a:r>
-            <a:r>
-              <a:rPr lang="zh-CN" altLang="en-US"/>
-              <a:t>使用</a:t>
-            </a:r>
-            <a:r>
-              <a:rPr lang="en-US" altLang="zh-CN"/>
-              <a:t>IBP避免over-regularization.</a:t>
-            </a:r>
-            <a:endParaRPr lang="en-US" altLang="zh-CN"/>
-          </a:p>
-          <a:p>
-            <a:pPr indent="0" fontAlgn="auto">
-              <a:lnSpc>
-                <a:spcPct val="150000"/>
-              </a:lnSpc>
-            </a:pPr>
-            <a:r>
-              <a:rPr lang="zh-CN" altLang="en-US"/>
-              <a:t>（</a:t>
-            </a:r>
-            <a:r>
-              <a:rPr lang="en-US" altLang="zh-CN"/>
-              <a:t>3</a:t>
-            </a:r>
-            <a:r>
-              <a:rPr lang="zh-CN" altLang="en-US"/>
-              <a:t>）对于特别小的</a:t>
-            </a:r>
-            <a:r>
-              <a:rPr lang="en-US" altLang="zh-CN"/>
-              <a:t>radius</a:t>
-            </a:r>
-            <a:r>
-              <a:rPr lang="zh-CN" altLang="en-US"/>
-              <a:t>，可以令</a:t>
-            </a:r>
-            <a:r>
-              <a:rPr lang="en-US" altLang="zh-CN"/>
-              <a:t> </a:t>
-            </a:r>
-            <a:r>
-              <a:rPr lang="en-US" altLang="zh-CN">
-                <a:sym typeface="+mn-ea"/>
-              </a:rPr>
-              <a:t>β </a:t>
-            </a:r>
-            <a:r>
-              <a:rPr lang="zh-CN" altLang="en-US">
-                <a:sym typeface="+mn-ea"/>
-              </a:rPr>
-              <a:t>保持</a:t>
-            </a:r>
-            <a:r>
-              <a:rPr lang="en-US" altLang="zh-CN">
-                <a:sym typeface="+mn-ea"/>
-              </a:rPr>
-              <a:t>1.</a:t>
-            </a:r>
-            <a:endParaRPr lang="en-US" altLang="zh-CN">
-              <a:sym typeface="+mn-ea"/>
-            </a:endParaRPr>
-          </a:p>
-        </p:txBody>
-      </p:sp>
-      <p:pic>
-        <p:nvPicPr>
-          <p:cNvPr id="4" name="图片 3"/>
-          <p:cNvPicPr>
-            <a:picLocks noChangeAspect="1"/>
-          </p:cNvPicPr>
-          <p:nvPr>
-            <p:custDataLst>
-              <p:tags r:id="rId1"/>
-            </p:custDataLst>
-          </p:nvPr>
-        </p:nvPicPr>
-        <p:blipFill>
-          <a:blip r:embed="rId2"/>
-          <a:stretch>
-            <a:fillRect/>
-          </a:stretch>
-        </p:blipFill>
-        <p:spPr>
-          <a:xfrm>
-            <a:off x="632460" y="3676015"/>
-            <a:ext cx="11179175" cy="1506855"/>
-          </a:xfrm>
-          <a:prstGeom prst="rect">
-            <a:avLst/>
-          </a:prstGeom>
-        </p:spPr>
-      </p:pic>
-      <p:sp>
-        <p:nvSpPr>
-          <p:cNvPr id="6" name="文本框 5"/>
-          <p:cNvSpPr txBox="1"/>
-          <p:nvPr>
-            <p:custDataLst>
-              <p:tags r:id="rId3"/>
-            </p:custDataLst>
-          </p:nvPr>
-        </p:nvSpPr>
-        <p:spPr>
-          <a:xfrm>
-            <a:off x="485140" y="5812790"/>
-            <a:ext cx="11378565" cy="686435"/>
-          </a:xfrm>
-          <a:prstGeom prst="rect">
-            <a:avLst/>
-          </a:prstGeom>
-          <a:noFill/>
-        </p:spPr>
-        <p:txBody>
-          <a:bodyPr wrap="square" rtlCol="0">
-            <a:noAutofit/>
-          </a:bodyPr>
-          <a:p>
-            <a:r>
-              <a:rPr sz="1600"/>
-              <a:t>H</a:t>
-            </a:r>
-            <a:r>
-              <a:rPr lang="en-US" sz="1600"/>
-              <a:t>.</a:t>
-            </a:r>
-            <a:r>
-              <a:rPr sz="1600"/>
-              <a:t> Zhang</a:t>
-            </a:r>
-            <a:r>
-              <a:rPr lang="en-US" sz="1600"/>
-              <a:t>,</a:t>
-            </a:r>
-            <a:r>
-              <a:rPr sz="1600"/>
-              <a:t> Towards stable and efficient training of verifiably robust neural networks. In International Conference on Learning Representations, 2020.</a:t>
-            </a:r>
-            <a:endParaRPr sz="1600"/>
           </a:p>
         </p:txBody>
       </p:sp>
@@ -7146,7 +7092,7 @@
       <p:grpSpPr/>
       <p:sp>
         <p:nvSpPr>
-          <p:cNvPr id="3" name="标题 2"/>
+          <p:cNvPr id="2" name="标题 1"/>
           <p:cNvSpPr>
             <a:spLocks noGrp="1"/>
           </p:cNvSpPr>
@@ -7156,23 +7102,239 @@
         </p:nvSpPr>
         <p:spPr/>
         <p:txBody>
-          <a:bodyPr/>
-          <a:p>
+          <a:bodyPr>
+            <a:normAutofit/>
+          </a:bodyPr>
+          <a:p>
+            <a:r>
+              <a:rPr altLang="zh-CN" sz="2665">
+                <a:sym typeface="+mn-ea"/>
+              </a:rPr>
+              <a:t>Towards Stable and Efficient Training of Verifiably Robust Neural Networks</a:t>
+            </a:r>
+            <a:endParaRPr lang="zh-CN" altLang="en-US" sz="2665"/>
+          </a:p>
+        </p:txBody>
+      </p:sp>
+      <p:sp>
+        <p:nvSpPr>
+          <p:cNvPr id="5" name="文本框 4"/>
+          <p:cNvSpPr txBox="1"/>
+          <p:nvPr/>
+        </p:nvSpPr>
+        <p:spPr>
+          <a:xfrm>
+            <a:off x="485140" y="1816735"/>
+            <a:ext cx="10507345" cy="1753235"/>
+          </a:xfrm>
+          <a:prstGeom prst="rect">
+            <a:avLst/>
+          </a:prstGeom>
+          <a:noFill/>
+        </p:spPr>
+        <p:txBody>
+          <a:bodyPr wrap="square" rtlCol="0">
+            <a:spAutoFit/>
+          </a:bodyPr>
+          <a:p>
+            <a:pPr indent="0" fontAlgn="auto">
+              <a:lnSpc>
+                <a:spcPct val="150000"/>
+              </a:lnSpc>
+            </a:pPr>
+            <a:r>
+              <a:rPr lang="en-US" altLang="zh-CN" b="1"/>
+              <a:t>Key Insight:</a:t>
+            </a:r>
             <a:r>
               <a:rPr lang="en-US" altLang="zh-CN"/>
-              <a:t>E</a:t>
+              <a:t> </a:t>
+            </a:r>
+            <a:r>
+              <a:rPr lang="zh-CN" altLang="en-US"/>
+              <a:t>将</a:t>
             </a:r>
             <a:r>
               <a:rPr lang="en-US" altLang="zh-CN"/>
-              <a:t>xperiment</a:t>
+              <a:t>natural loss</a:t>
+            </a:r>
+            <a:r>
+              <a:rPr lang="zh-CN" altLang="en-US"/>
+              <a:t>，</a:t>
+            </a:r>
+            <a:r>
+              <a:rPr lang="en-US" altLang="zh-CN"/>
+              <a:t>IBP bound </a:t>
+            </a:r>
+            <a:r>
+              <a:rPr lang="zh-CN" altLang="en-US"/>
+              <a:t>和</a:t>
+            </a:r>
+            <a:r>
+              <a:rPr lang="en-US" altLang="zh-CN"/>
+              <a:t> crown-IBP bound </a:t>
+            </a:r>
+            <a:r>
+              <a:rPr lang="zh-CN" altLang="en-US"/>
+              <a:t>组合在一起进行训练</a:t>
+            </a:r>
+            <a:endParaRPr lang="en-US" altLang="zh-CN"/>
+          </a:p>
+          <a:p>
+            <a:pPr indent="0" fontAlgn="auto">
+              <a:lnSpc>
+                <a:spcPct val="150000"/>
+              </a:lnSpc>
+            </a:pPr>
+            <a:r>
+              <a:rPr lang="zh-CN" altLang="en-US"/>
+              <a:t>（</a:t>
+            </a:r>
+            <a:r>
+              <a:rPr lang="en-US" altLang="zh-CN"/>
+              <a:t>1</a:t>
+            </a:r>
+            <a:r>
+              <a:rPr lang="zh-CN" altLang="en-US"/>
+              <a:t>）</a:t>
+            </a:r>
+            <a:r>
+              <a:rPr lang="en-US" altLang="zh-CN"/>
+              <a:t>比 IBP 更通用，</a:t>
+            </a:r>
+            <a:r>
+              <a:rPr lang="zh-CN" altLang="en-US"/>
+              <a:t>可根据</a:t>
+            </a:r>
+            <a:r>
+              <a:rPr lang="en-US" altLang="zh-CN"/>
+              <a:t>radius</a:t>
+            </a:r>
+            <a:r>
+              <a:rPr lang="zh-CN" altLang="en-US"/>
+              <a:t>灵活结合</a:t>
+            </a:r>
+            <a:r>
+              <a:rPr lang="en-US" altLang="zh-CN"/>
+              <a:t>IBP</a:t>
+            </a:r>
+            <a:r>
+              <a:rPr lang="zh-CN" altLang="en-US"/>
+              <a:t>和凸松弛方法</a:t>
+            </a:r>
+            <a:r>
+              <a:rPr lang="en-US" altLang="zh-CN"/>
+              <a:t>.</a:t>
             </a:r>
             <a:endParaRPr lang="zh-CN" altLang="en-US"/>
+          </a:p>
+          <a:p>
+            <a:pPr indent="0" fontAlgn="auto">
+              <a:lnSpc>
+                <a:spcPct val="150000"/>
+              </a:lnSpc>
+            </a:pPr>
+            <a:r>
+              <a:rPr lang="zh-CN" altLang="en-US"/>
+              <a:t>（</a:t>
+            </a:r>
+            <a:r>
+              <a:rPr lang="en-US" altLang="zh-CN"/>
+              <a:t>2</a:t>
+            </a:r>
+            <a:r>
+              <a:rPr lang="zh-CN" altLang="en-US"/>
+              <a:t>）先用更紧的界保证初始训练稳定</a:t>
+            </a:r>
+            <a:r>
+              <a:rPr lang="en-US" altLang="zh-CN"/>
+              <a:t>(</a:t>
+            </a:r>
+            <a:r>
+              <a:rPr lang="en-US" altLang="zh-CN">
+                <a:sym typeface="+mn-ea"/>
+              </a:rPr>
+              <a:t> β = 1</a:t>
+            </a:r>
+            <a:r>
+              <a:rPr lang="en-US" altLang="zh-CN"/>
+              <a:t>), </a:t>
+            </a:r>
+            <a:r>
+              <a:rPr lang="zh-CN" altLang="en-US"/>
+              <a:t>后逐渐</a:t>
+            </a:r>
+            <a:r>
+              <a:rPr lang="en-US" altLang="zh-CN"/>
+              <a:t>将 β 降低到 0，</a:t>
+            </a:r>
+            <a:r>
+              <a:rPr lang="zh-CN" altLang="en-US"/>
+              <a:t>使用</a:t>
+            </a:r>
+            <a:r>
+              <a:rPr lang="en-US" altLang="zh-CN"/>
+              <a:t>IBP避免over-regularization.</a:t>
+            </a:r>
+            <a:endParaRPr lang="en-US" altLang="zh-CN"/>
+          </a:p>
+          <a:p>
+            <a:pPr indent="0" fontAlgn="auto">
+              <a:lnSpc>
+                <a:spcPct val="150000"/>
+              </a:lnSpc>
+            </a:pPr>
+            <a:r>
+              <a:rPr lang="zh-CN" altLang="en-US"/>
+              <a:t>（</a:t>
+            </a:r>
+            <a:r>
+              <a:rPr lang="en-US" altLang="zh-CN"/>
+              <a:t>3</a:t>
+            </a:r>
+            <a:r>
+              <a:rPr lang="zh-CN" altLang="en-US"/>
+              <a:t>）对于特别小的</a:t>
+            </a:r>
+            <a:r>
+              <a:rPr lang="en-US" altLang="zh-CN"/>
+              <a:t>radius</a:t>
+            </a:r>
+            <a:r>
+              <a:rPr lang="zh-CN" altLang="en-US"/>
+              <a:t>，可以令</a:t>
+            </a:r>
+            <a:r>
+              <a:rPr lang="en-US" altLang="zh-CN"/>
+              <a:t> </a:t>
+            </a:r>
+            <a:r>
+              <a:rPr lang="en-US" altLang="zh-CN">
+                <a:sym typeface="+mn-ea"/>
+              </a:rPr>
+              <a:t>β </a:t>
+            </a:r>
+            <a:r>
+              <a:rPr lang="zh-CN" altLang="en-US">
+                <a:sym typeface="+mn-ea"/>
+              </a:rPr>
+              <a:t>保持</a:t>
+            </a:r>
+            <a:r>
+              <a:rPr lang="en-US" altLang="zh-CN">
+                <a:sym typeface="+mn-ea"/>
+              </a:rPr>
+              <a:t>1.</a:t>
+            </a:r>
+            <a:endParaRPr lang="en-US" altLang="zh-CN">
+              <a:sym typeface="+mn-ea"/>
+            </a:endParaRPr>
           </a:p>
         </p:txBody>
       </p:sp>
       <p:pic>
         <p:nvPicPr>
-          <p:cNvPr id="6" name="图片 5"/>
+          <p:cNvPr id="4" name="图片 3"/>
           <p:cNvPicPr>
             <a:picLocks noChangeAspect="1"/>
           </p:cNvPicPr>
@@ -7190,8 +7352,8 @@
         </p:blipFill>
         <p:spPr>
           <a:xfrm>
-            <a:off x="1054100" y="1092835"/>
-            <a:ext cx="7358380" cy="5719445"/>
+            <a:off x="632460" y="3676015"/>
+            <a:ext cx="11179175" cy="1506855"/>
           </a:xfrm>
           <a:prstGeom prst="rect">
             <a:avLst/>
@@ -7200,7 +7362,7 @@
       </p:pic>
       <p:sp>
         <p:nvSpPr>
-          <p:cNvPr id="11" name="文本框 10"/>
+          <p:cNvPr id="6" name="文本框 5"/>
           <p:cNvSpPr txBox="1"/>
           <p:nvPr>
             <p:custDataLst>
@@ -7210,8 +7372,8 @@
         </p:nvSpPr>
         <p:spPr>
           <a:xfrm>
-            <a:off x="7056120" y="5233670"/>
-            <a:ext cx="4786630" cy="340995"/>
+            <a:off x="485140" y="5812790"/>
+            <a:ext cx="11378565" cy="686435"/>
           </a:xfrm>
           <a:prstGeom prst="rect">
             <a:avLst/>
@@ -7224,10 +7386,26 @@
           </a:bodyPr>
           <a:p>
             <a:r>
-              <a:rPr lang="en-US" sz="1200"/>
-              <a:t>Y. Mao, M. N. Muller, M. Fischer, and M. Vechev. Taps: Connecting certified and adversarial training, 2023. arXiv: 2305.04574.</a:t>
-            </a:r>
-            <a:endParaRPr lang="en-US" sz="1200"/>
+              <a:rPr sz="1600"/>
+              <a:t>H</a:t>
+            </a:r>
+            <a:r>
+              <a:rPr lang="en-US" sz="1600"/>
+              <a:t>.</a:t>
+            </a:r>
+            <a:r>
+              <a:rPr sz="1600"/>
+              <a:t> Zhang</a:t>
+            </a:r>
+            <a:r>
+              <a:rPr lang="en-US" sz="1600"/>
+              <a:t>,</a:t>
+            </a:r>
+            <a:r>
+              <a:rPr sz="1600"/>
+              <a:t> Towards stable and efficient training of verifiably robust neural networks. In International Conference on Learning Representations, 2020.</a:t>
+            </a:r>
+            <a:endParaRPr sz="1600"/>
           </a:p>
         </p:txBody>
       </p:sp>
@@ -7251,145 +7429,6 @@
       <p:grpSpPr/>
       <p:sp>
         <p:nvSpPr>
-          <p:cNvPr id="2" name="内容占位符 1"/>
-          <p:cNvSpPr>
-            <a:spLocks noGrp="1"/>
-          </p:cNvSpPr>
-          <p:nvPr>
-            <p:ph idx="1"/>
-          </p:nvPr>
-        </p:nvSpPr>
-        <p:spPr/>
-        <p:txBody>
-          <a:bodyPr/>
-          <a:p>
-            <a:pPr fontAlgn="auto">
-              <a:lnSpc>
-                <a:spcPct val="150000"/>
-              </a:lnSpc>
-            </a:pPr>
-            <a:r>
-              <a:rPr lang="zh-CN" altLang="en-US"/>
-              <a:t>预处理：</a:t>
-            </a:r>
-            <a:r>
-              <a:rPr lang="zh-CN" altLang="en-US"/>
-              <a:t>编码性质</a:t>
-            </a:r>
-            <a:endParaRPr lang="zh-CN" altLang="en-US"/>
-          </a:p>
-          <a:p>
-            <a:pPr lvl="1" fontAlgn="auto">
-              <a:lnSpc>
-                <a:spcPct val="150000"/>
-              </a:lnSpc>
-            </a:pPr>
-            <a:r>
-              <a:rPr lang="zh-CN" altLang="en-US"/>
-              <a:t>将数据一一编码：数据</a:t>
-            </a:r>
-            <a:r>
-              <a:rPr lang="en-US" altLang="zh-CN"/>
-              <a:t>+</a:t>
-            </a:r>
-            <a:r>
-              <a:rPr lang="zh-CN" altLang="en-US"/>
-              <a:t>敏感属性</a:t>
-            </a:r>
-            <a:r>
-              <a:rPr lang="en-US" altLang="zh-CN"/>
-              <a:t> → </a:t>
-            </a:r>
-            <a:r>
-              <a:rPr lang="zh-CN" altLang="en-US"/>
-              <a:t>一个</a:t>
-            </a:r>
-            <a:r>
-              <a:rPr lang="zh-CN" altLang="en-US"/>
-              <a:t>性质</a:t>
-            </a:r>
-            <a:endParaRPr lang="zh-CN" altLang="en-US"/>
-          </a:p>
-          <a:p>
-            <a:pPr lvl="0" fontAlgn="auto">
-              <a:lnSpc>
-                <a:spcPct val="150000"/>
-              </a:lnSpc>
-            </a:pPr>
-            <a:r>
-              <a:rPr lang="zh-CN" altLang="en-US"/>
-              <a:t>实验</a:t>
-            </a:r>
-            <a:r>
-              <a:rPr lang="zh-CN" altLang="en-US"/>
-              <a:t>设置：</a:t>
-            </a:r>
-            <a:endParaRPr lang="zh-CN" altLang="en-US"/>
-          </a:p>
-          <a:p>
-            <a:pPr lvl="1" fontAlgn="auto">
-              <a:lnSpc>
-                <a:spcPct val="150000"/>
-              </a:lnSpc>
-            </a:pPr>
-            <a:r>
-              <a:rPr lang="zh-CN" altLang="en-US" sz="2400"/>
-              <a:t>所有数据（性质）共同修复</a:t>
-            </a:r>
-            <a:endParaRPr lang="zh-CN" altLang="en-US" sz="2400"/>
-          </a:p>
-          <a:p>
-            <a:pPr lvl="1" fontAlgn="auto">
-              <a:lnSpc>
-                <a:spcPct val="150000"/>
-              </a:lnSpc>
-            </a:pPr>
-            <a:r>
-              <a:rPr lang="en-US" altLang="zh-CN" sz="2400"/>
-              <a:t>indicator</a:t>
-            </a:r>
-            <a:r>
-              <a:rPr lang="zh-CN" altLang="en-US" sz="2400"/>
-              <a:t>与</a:t>
-            </a:r>
-            <a:r>
-              <a:rPr lang="en-US" altLang="zh-CN" sz="2400"/>
-              <a:t>patch</a:t>
-            </a:r>
-            <a:r>
-              <a:rPr lang="zh-CN" altLang="en-US" sz="2400"/>
-              <a:t>网络设置</a:t>
-            </a:r>
-            <a:r>
-              <a:rPr lang="zh-CN" altLang="en-US" sz="2400"/>
-              <a:t>和修复安全性质相同</a:t>
-            </a:r>
-            <a:endParaRPr lang="zh-CN" altLang="en-US" sz="2400"/>
-          </a:p>
-          <a:p>
-            <a:pPr lvl="1" fontAlgn="auto">
-              <a:lnSpc>
-                <a:spcPct val="150000"/>
-              </a:lnSpc>
-            </a:pPr>
-            <a:r>
-              <a:rPr lang="zh-CN" altLang="en-US" sz="2400"/>
-              <a:t>两组实验：训练集和测试集相同及</a:t>
-            </a:r>
-            <a:r>
-              <a:rPr lang="zh-CN" altLang="en-US" sz="2400"/>
-              <a:t>不同</a:t>
-            </a:r>
-            <a:endParaRPr lang="zh-CN" altLang="en-US"/>
-          </a:p>
-          <a:p>
-            <a:pPr lvl="1"/>
-            <a:endParaRPr lang="zh-CN" altLang="en-US"/>
-          </a:p>
-        </p:txBody>
-      </p:sp>
-      <p:sp>
-        <p:nvSpPr>
           <p:cNvPr id="3" name="标题 2"/>
           <p:cNvSpPr>
             <a:spLocks noGrp="1"/>
@@ -7404,9 +7443,74 @@
           <a:p>
             <a:r>
               <a:rPr lang="en-US" altLang="zh-CN"/>
-              <a:t>EXperiment: repair fairness property</a:t>
-            </a:r>
-            <a:endParaRPr lang="en-US" altLang="zh-CN"/>
+              <a:t>E</a:t>
+            </a:r>
+            <a:r>
+              <a:rPr lang="en-US" altLang="zh-CN"/>
+              <a:t>xperiment</a:t>
+            </a:r>
+            <a:endParaRPr lang="zh-CN" altLang="en-US"/>
+          </a:p>
+        </p:txBody>
+      </p:sp>
+      <p:pic>
+        <p:nvPicPr>
+          <p:cNvPr id="6" name="图片 5"/>
+          <p:cNvPicPr>
+            <a:picLocks noChangeAspect="1"/>
+          </p:cNvPicPr>
+          <p:nvPr>
+            <p:custDataLst>
+              <p:tags r:id="rId1"/>
+            </p:custDataLst>
+          </p:nvPr>
+        </p:nvPicPr>
+        <p:blipFill>
+          <a:blip r:embed="rId2"/>
+          <a:stretch>
+            <a:fillRect/>
+          </a:stretch>
+        </p:blipFill>
+        <p:spPr>
+          <a:xfrm>
+            <a:off x="1054100" y="1092835"/>
+            <a:ext cx="7358380" cy="5719445"/>
+          </a:xfrm>
+          <a:prstGeom prst="rect">
+            <a:avLst/>
+          </a:prstGeom>
+        </p:spPr>
+      </p:pic>
+      <p:sp>
+        <p:nvSpPr>
+          <p:cNvPr id="11" name="文本框 10"/>
+          <p:cNvSpPr txBox="1"/>
+          <p:nvPr>
+            <p:custDataLst>
+              <p:tags r:id="rId3"/>
+            </p:custDataLst>
+          </p:nvPr>
+        </p:nvSpPr>
+        <p:spPr>
+          <a:xfrm>
+            <a:off x="7056120" y="5233670"/>
+            <a:ext cx="4786630" cy="340995"/>
+          </a:xfrm>
+          <a:prstGeom prst="rect">
+            <a:avLst/>
+          </a:prstGeom>
+          <a:noFill/>
+        </p:spPr>
+        <p:txBody>
+          <a:bodyPr wrap="square" rtlCol="0">
+            <a:noAutofit/>
+          </a:bodyPr>
+          <a:p>
+            <a:r>
+              <a:rPr lang="en-US" sz="1200"/>
+              <a:t>Y. Mao, M. N. Muller, M. Fischer, and M. Vechev. Taps: Connecting certified and adversarial training, 2023. arXiv: 2305.04574.</a:t>
+            </a:r>
+            <a:endParaRPr lang="en-US" sz="1200"/>
           </a:p>
         </p:txBody>
       </p:sp>
@@ -7430,324 +7534,240 @@
       <p:grpSpPr/>
       <p:sp>
         <p:nvSpPr>
-          <p:cNvPr id="2" name="内容占位符 1"/>
+          <p:cNvPr id="2" name="标题 1"/>
           <p:cNvSpPr>
             <a:spLocks noGrp="1"/>
           </p:cNvSpPr>
           <p:nvPr>
-            <p:ph idx="1"/>
+            <p:ph type="title"/>
           </p:nvPr>
         </p:nvSpPr>
         <p:spPr/>
         <p:txBody>
-          <a:bodyPr/>
-          <a:p>
-            <a:pPr lvl="1" fontAlgn="auto">
+          <a:bodyPr>
+            <a:normAutofit/>
+          </a:bodyPr>
+          <a:p>
+            <a:r>
+              <a:rPr sz="3555">
+                <a:sym typeface="+mn-ea"/>
+              </a:rPr>
+              <a:t>DL2: training and querying neural network with Logic</a:t>
+            </a:r>
+            <a:endParaRPr lang="zh-CN" altLang="en-US" sz="3555"/>
+          </a:p>
+        </p:txBody>
+      </p:sp>
+      <p:sp>
+        <p:nvSpPr>
+          <p:cNvPr id="11" name="文本框 10"/>
+          <p:cNvSpPr txBox="1"/>
+          <p:nvPr>
+            <p:custDataLst>
+              <p:tags r:id="rId1"/>
+            </p:custDataLst>
+          </p:nvPr>
+        </p:nvSpPr>
+        <p:spPr>
+          <a:xfrm>
+            <a:off x="319405" y="6256020"/>
+            <a:ext cx="11155680" cy="340995"/>
+          </a:xfrm>
+          <a:prstGeom prst="rect">
+            <a:avLst/>
+          </a:prstGeom>
+          <a:noFill/>
+        </p:spPr>
+        <p:txBody>
+          <a:bodyPr wrap="square" rtlCol="0">
+            <a:noAutofit/>
+          </a:bodyPr>
+          <a:p>
+            <a:r>
+              <a:rPr lang="en-US" sz="900"/>
+              <a:t> Marc Fischer, Mislav Balunovic, Dana Drachsler-Cohen, Timon Gehr, Ce Zhang, and Martin T. Vechev. DL2: training and querying neural network with Logic</a:t>
+            </a:r>
+            <a:r>
+              <a:rPr lang="zh-CN" altLang="en-US" sz="900"/>
+              <a:t>，</a:t>
+            </a:r>
+            <a:r>
+              <a:rPr lang="en-US" altLang="zh-CN" sz="900"/>
+              <a:t>IC</a:t>
+            </a:r>
+            <a:r>
+              <a:rPr lang="en-US" altLang="zh-CN" sz="900"/>
+              <a:t>ML 2019</a:t>
+            </a:r>
+            <a:endParaRPr lang="en-US" altLang="zh-CN" sz="900"/>
+          </a:p>
+        </p:txBody>
+      </p:sp>
+      <p:sp>
+        <p:nvSpPr>
+          <p:cNvPr id="5" name="文本框 4"/>
+          <p:cNvSpPr txBox="1"/>
+          <p:nvPr/>
+        </p:nvSpPr>
+        <p:spPr>
+          <a:xfrm>
+            <a:off x="485140" y="1586230"/>
+            <a:ext cx="10507345" cy="506730"/>
+          </a:xfrm>
+          <a:prstGeom prst="rect">
+            <a:avLst/>
+          </a:prstGeom>
+          <a:noFill/>
+        </p:spPr>
+        <p:txBody>
+          <a:bodyPr wrap="square" rtlCol="0">
+            <a:spAutoFit/>
+          </a:bodyPr>
+          <a:p>
+            <a:pPr indent="0" fontAlgn="auto">
               <a:lnSpc>
                 <a:spcPct val="150000"/>
               </a:lnSpc>
             </a:pPr>
             <a:r>
-              <a:rPr lang="zh-CN" altLang="en-US"/>
-              <a:t>实验结果：</a:t>
+              <a:rPr lang="en-US" altLang="zh-CN" b="1"/>
+              <a:t>Key Insight:</a:t>
+            </a:r>
+            <a:r>
+              <a:rPr lang="en-US" altLang="zh-CN"/>
+              <a:t> </a:t>
+            </a:r>
+            <a:r>
+              <a:t>将逻辑约束转换为具有所需数学特性的损失函数</a:t>
+            </a:r>
+            <a:r>
+              <a:rPr lang="en-US"/>
+              <a:t>, </a:t>
+            </a:r>
+            <a:r>
+              <a:rPr lang="zh-CN" altLang="en-US"/>
+              <a:t>通过梯度下降方法训练网络</a:t>
+            </a:r>
+            <a:r>
+              <a:rPr lang="zh-CN" altLang="en-US"/>
+              <a:t>满足约束</a:t>
             </a:r>
             <a:endParaRPr lang="zh-CN" altLang="en-US"/>
           </a:p>
-          <a:p>
-            <a:pPr lvl="1" fontAlgn="auto">
-              <a:lnSpc>
-                <a:spcPct val="150000"/>
-              </a:lnSpc>
-            </a:pPr>
-            <a:endParaRPr lang="zh-CN" altLang="en-US"/>
-          </a:p>
-          <a:p>
-            <a:pPr lvl="1" fontAlgn="auto">
-              <a:lnSpc>
-                <a:spcPct val="150000"/>
-              </a:lnSpc>
-            </a:pPr>
-            <a:endParaRPr lang="zh-CN" altLang="en-US"/>
-          </a:p>
-          <a:p>
-            <a:pPr lvl="1" fontAlgn="auto">
-              <a:lnSpc>
-                <a:spcPct val="150000"/>
-              </a:lnSpc>
-            </a:pPr>
-            <a:endParaRPr lang="zh-CN" altLang="en-US"/>
-          </a:p>
-          <a:p>
-            <a:pPr lvl="1" fontAlgn="auto">
-              <a:lnSpc>
-                <a:spcPct val="150000"/>
-              </a:lnSpc>
-            </a:pPr>
-            <a:r>
-              <a:rPr lang="zh-CN" altLang="en-US"/>
-              <a:t>结果</a:t>
-            </a:r>
-            <a:r>
-              <a:rPr lang="zh-CN" altLang="en-US"/>
-              <a:t>分析：</a:t>
-            </a:r>
-            <a:endParaRPr lang="zh-CN" altLang="en-US"/>
-          </a:p>
-          <a:p>
-            <a:pPr lvl="2" fontAlgn="auto">
-              <a:lnSpc>
-                <a:spcPct val="150000"/>
-              </a:lnSpc>
-            </a:pPr>
-            <a:r>
-              <a:rPr lang="zh-CN" altLang="en-US"/>
-              <a:t>测试集和训练集分布差距</a:t>
-            </a:r>
-            <a:r>
-              <a:rPr lang="zh-CN" altLang="en-US"/>
-              <a:t>可能太大，</a:t>
-            </a:r>
-            <a:r>
-              <a:rPr lang="zh-CN" altLang="en-US"/>
-              <a:t>需要进一步调整</a:t>
-            </a:r>
-            <a:endParaRPr lang="zh-CN" altLang="en-US"/>
-          </a:p>
-          <a:p>
-            <a:pPr lvl="2" fontAlgn="auto">
-              <a:lnSpc>
-                <a:spcPct val="150000"/>
-              </a:lnSpc>
-            </a:pPr>
-            <a:r>
-              <a:rPr lang="zh-CN" altLang="en-US"/>
-              <a:t>性质编码问题导致网络参数可行解域很小，后续需选择更加合适的</a:t>
-            </a:r>
-            <a:r>
-              <a:rPr lang="zh-CN" altLang="en-US"/>
-              <a:t>定义</a:t>
-            </a:r>
-            <a:endParaRPr lang="zh-CN" altLang="en-US"/>
-          </a:p>
-          <a:p>
-            <a:pPr lvl="2"/>
-            <a:endParaRPr lang="zh-CN" altLang="en-US"/>
-          </a:p>
-          <a:p>
-            <a:pPr lvl="2"/>
-            <a:endParaRPr lang="zh-CN" altLang="en-US"/>
-          </a:p>
         </p:txBody>
       </p:sp>
-      <p:sp>
-        <p:nvSpPr>
-          <p:cNvPr id="3" name="标题 2"/>
-          <p:cNvSpPr>
-            <a:spLocks noGrp="1"/>
-          </p:cNvSpPr>
-          <p:nvPr>
-            <p:ph type="title"/>
-          </p:nvPr>
-        </p:nvSpPr>
-        <p:spPr/>
-        <p:txBody>
-          <a:bodyPr/>
-          <a:p>
-            <a:r>
-              <a:rPr lang="en-US" altLang="zh-CN"/>
-              <a:t>EXperiment: repair fairness property</a:t>
-            </a:r>
-            <a:endParaRPr lang="en-US" altLang="zh-CN"/>
-          </a:p>
-        </p:txBody>
-      </p:sp>
-      <p:graphicFrame>
-        <p:nvGraphicFramePr>
-          <p:cNvPr id="5" name="表格 4"/>
-          <p:cNvGraphicFramePr/>
+      <p:pic>
+        <p:nvPicPr>
+          <p:cNvPr id="4" name="图片 3"/>
+          <p:cNvPicPr>
+            <a:picLocks noChangeAspect="1"/>
+          </p:cNvPicPr>
           <p:nvPr>
             <p:custDataLst>
-              <p:tags r:id="rId1"/>
+              <p:tags r:id="rId2"/>
             </p:custDataLst>
           </p:nvPr>
-        </p:nvGraphicFramePr>
-        <p:xfrm>
-          <a:off x="1818005" y="2336800"/>
-          <a:ext cx="8533765" cy="1143000"/>
-        </p:xfrm>
-        <a:graphic>
-          <a:graphicData uri="http://schemas.openxmlformats.org/drawingml/2006/table">
-            <a:tbl>
-              <a:tblPr firstRow="1" bandRow="1">
-                <a:tableStyleId>{5C22544A-7EE6-4342-B048-85BDC9FD1C3A}</a:tableStyleId>
-              </a:tblPr>
-              <a:tblGrid>
-                <a:gridCol w="2844165"/>
-                <a:gridCol w="2844165"/>
-                <a:gridCol w="2844165"/>
-              </a:tblGrid>
-              <a:tr h="381000">
-                <a:tc>
-                  <a:txBody>
-                    <a:bodyPr/>
-                    <a:p>
-                      <a:pPr algn="ctr">
-                        <a:buNone/>
-                      </a:pPr>
-                      <a:r>
-                        <a:rPr lang="zh-CN" altLang="en-US"/>
-                        <a:t>训练集和测试集</a:t>
-                      </a:r>
-                      <a:r>
-                        <a:rPr lang="zh-CN" altLang="en-US"/>
-                        <a:t>是否相同</a:t>
-                      </a:r>
-                      <a:endParaRPr lang="zh-CN" altLang="en-US"/>
-                    </a:p>
-                  </a:txBody>
-                  <a:tcPr anchor="ctr" anchorCtr="0"/>
-                </a:tc>
-                <a:tc>
-                  <a:txBody>
-                    <a:bodyPr/>
-                    <a:p>
-                      <a:pPr algn="ctr">
-                        <a:buNone/>
-                      </a:pPr>
-                      <a:r>
-                        <a:rPr lang="zh-CN" altLang="en-US"/>
-                        <a:t>训练集准确率</a:t>
-                      </a:r>
-                      <a:endParaRPr lang="zh-CN" altLang="en-US"/>
-                    </a:p>
-                  </a:txBody>
-                  <a:tcPr anchor="ctr" anchorCtr="0"/>
-                </a:tc>
-                <a:tc>
-                  <a:txBody>
-                    <a:bodyPr/>
-                    <a:p>
-                      <a:pPr algn="ctr">
-                        <a:buNone/>
-                      </a:pPr>
-                      <a:r>
-                        <a:rPr lang="zh-CN" altLang="en-US"/>
-                        <a:t>测试集</a:t>
-                      </a:r>
-                      <a:r>
-                        <a:rPr lang="zh-CN" altLang="en-US"/>
-                        <a:t>准确率</a:t>
-                      </a:r>
-                      <a:endParaRPr lang="zh-CN" altLang="en-US"/>
-                    </a:p>
-                  </a:txBody>
-                  <a:tcPr anchor="ctr" anchorCtr="0"/>
-                </a:tc>
-              </a:tr>
-              <a:tr h="381000">
-                <a:tc>
-                  <a:txBody>
-                    <a:bodyPr/>
-                    <a:p>
-                      <a:pPr algn="ctr">
-                        <a:buNone/>
-                      </a:pPr>
-                      <a:r>
-                        <a:rPr lang="zh-CN" altLang="en-US"/>
-                        <a:t>相同</a:t>
-                      </a:r>
-                      <a:endParaRPr lang="zh-CN" altLang="en-US"/>
-                    </a:p>
-                  </a:txBody>
-                  <a:tcPr anchor="ctr" anchorCtr="0"/>
-                </a:tc>
-                <a:tc>
-                  <a:txBody>
-                    <a:bodyPr/>
-                    <a:p>
-                      <a:pPr>
-                        <a:buNone/>
-                      </a:pPr>
-                      <a:r>
-                        <a:rPr lang="en-US" altLang="zh-CN"/>
-                        <a:t>100</a:t>
-                      </a:r>
-                      <a:endParaRPr lang="en-US" altLang="zh-CN"/>
-                    </a:p>
-                  </a:txBody>
-                  <a:tcPr/>
-                </a:tc>
-                <a:tc>
-                  <a:txBody>
-                    <a:bodyPr/>
-                    <a:p>
-                      <a:pPr>
-                        <a:buNone/>
-                      </a:pPr>
-                      <a:r>
-                        <a:rPr lang="en-US" altLang="zh-CN"/>
-                        <a:t>100</a:t>
-                      </a:r>
-                      <a:endParaRPr lang="en-US" altLang="zh-CN"/>
-                    </a:p>
-                  </a:txBody>
-                  <a:tcPr/>
-                </a:tc>
-              </a:tr>
-              <a:tr h="381000">
-                <a:tc>
-                  <a:txBody>
-                    <a:bodyPr/>
-                    <a:p>
-                      <a:pPr algn="ctr">
-                        <a:buNone/>
-                      </a:pPr>
-                      <a:r>
-                        <a:rPr lang="zh-CN" altLang="en-US"/>
-                        <a:t>不同</a:t>
-                      </a:r>
-                      <a:endParaRPr lang="zh-CN" altLang="en-US"/>
-                    </a:p>
-                  </a:txBody>
-                  <a:tcPr anchor="ctr" anchorCtr="0"/>
-                </a:tc>
-                <a:tc>
-                  <a:txBody>
-                    <a:bodyPr/>
-                    <a:p>
-                      <a:pPr>
-                        <a:buNone/>
-                      </a:pPr>
-                      <a:r>
-                        <a:rPr lang="en-US" altLang="zh-CN"/>
-                        <a:t>84.65</a:t>
-                      </a:r>
-                      <a:endParaRPr lang="en-US" altLang="zh-CN"/>
-                    </a:p>
-                  </a:txBody>
-                  <a:tcPr/>
-                </a:tc>
-                <a:tc>
-                  <a:txBody>
-                    <a:bodyPr/>
-                    <a:p>
-                      <a:pPr>
-                        <a:buNone/>
-                      </a:pPr>
-                      <a:r>
-                        <a:rPr lang="en-US" altLang="zh-CN"/>
-                        <a:t>78</a:t>
-                      </a:r>
-                      <a:endParaRPr lang="en-US" altLang="zh-CN"/>
-                    </a:p>
-                  </a:txBody>
-                  <a:tcPr/>
-                </a:tc>
-              </a:tr>
-            </a:tbl>
-          </a:graphicData>
-        </a:graphic>
-      </p:graphicFrame>
+        </p:nvPicPr>
+        <p:blipFill>
+          <a:blip r:embed="rId3"/>
+          <a:stretch>
+            <a:fillRect/>
+          </a:stretch>
+        </p:blipFill>
+        <p:spPr>
+          <a:xfrm>
+            <a:off x="564515" y="2555240"/>
+            <a:ext cx="4398010" cy="873760"/>
+          </a:xfrm>
+          <a:prstGeom prst="rect">
+            <a:avLst/>
+          </a:prstGeom>
+        </p:spPr>
+      </p:pic>
+      <p:pic>
+        <p:nvPicPr>
+          <p:cNvPr id="6" name="图片 5"/>
+          <p:cNvPicPr>
+            <a:picLocks noChangeAspect="1"/>
+          </p:cNvPicPr>
+          <p:nvPr>
+            <p:custDataLst>
+              <p:tags r:id="rId4"/>
+            </p:custDataLst>
+          </p:nvPr>
+        </p:nvPicPr>
+        <p:blipFill>
+          <a:blip r:embed="rId5"/>
+          <a:stretch>
+            <a:fillRect/>
+          </a:stretch>
+        </p:blipFill>
+        <p:spPr>
+          <a:xfrm>
+            <a:off x="733425" y="3256915"/>
+            <a:ext cx="4302125" cy="981075"/>
+          </a:xfrm>
+          <a:prstGeom prst="rect">
+            <a:avLst/>
+          </a:prstGeom>
+        </p:spPr>
+      </p:pic>
+      <p:pic>
+        <p:nvPicPr>
+          <p:cNvPr id="7" name="图片 6"/>
+          <p:cNvPicPr>
+            <a:picLocks noChangeAspect="1"/>
+          </p:cNvPicPr>
+          <p:nvPr>
+            <p:custDataLst>
+              <p:tags r:id="rId6"/>
+            </p:custDataLst>
+          </p:nvPr>
+        </p:nvPicPr>
+        <p:blipFill>
+          <a:blip r:embed="rId7"/>
+          <a:stretch>
+            <a:fillRect/>
+          </a:stretch>
+        </p:blipFill>
+        <p:spPr>
+          <a:xfrm>
+            <a:off x="888365" y="4108450"/>
+            <a:ext cx="3606800" cy="844550"/>
+          </a:xfrm>
+          <a:prstGeom prst="rect">
+            <a:avLst/>
+          </a:prstGeom>
+        </p:spPr>
+      </p:pic>
+      <p:pic>
+        <p:nvPicPr>
+          <p:cNvPr id="8" name="图片 7"/>
+          <p:cNvPicPr>
+            <a:picLocks noChangeAspect="1"/>
+          </p:cNvPicPr>
+          <p:nvPr>
+            <p:custDataLst>
+              <p:tags r:id="rId8"/>
+            </p:custDataLst>
+          </p:nvPr>
+        </p:nvPicPr>
+        <p:blipFill>
+          <a:blip r:embed="rId9"/>
+          <a:stretch>
+            <a:fillRect/>
+          </a:stretch>
+        </p:blipFill>
+        <p:spPr>
+          <a:xfrm>
+            <a:off x="5789930" y="2387600"/>
+            <a:ext cx="5280660" cy="2899410"/>
+          </a:xfrm>
+          <a:prstGeom prst="rect">
+            <a:avLst/>
+          </a:prstGeom>
+        </p:spPr>
+      </p:pic>
     </p:spTree>
   </p:cSld>
   <p:clrMapOvr>
@@ -7768,6 +7788,187 @@
       <p:grpSpPr/>
       <p:sp>
         <p:nvSpPr>
+          <p:cNvPr id="2" name="内容占位符 1"/>
+          <p:cNvSpPr>
+            <a:spLocks noGrp="1"/>
+          </p:cNvSpPr>
+          <p:nvPr>
+            <p:ph idx="1"/>
+          </p:nvPr>
+        </p:nvSpPr>
+        <p:spPr/>
+        <p:txBody>
+          <a:bodyPr>
+            <a:normAutofit lnSpcReduction="10000"/>
+          </a:bodyPr>
+          <a:p>
+            <a:pPr fontAlgn="auto">
+              <a:lnSpc>
+                <a:spcPct val="150000"/>
+              </a:lnSpc>
+            </a:pPr>
+            <a:r>
+              <a:rPr lang="en-US" altLang="zh-CN"/>
+              <a:t>certified training </a:t>
+            </a:r>
+            <a:r>
+              <a:rPr lang="zh-CN" altLang="en-US"/>
+              <a:t>用于</a:t>
+            </a:r>
+            <a:r>
+              <a:rPr lang="en-US" altLang="zh-CN"/>
+              <a:t> repair</a:t>
+            </a:r>
+            <a:endParaRPr lang="en-US" altLang="zh-CN"/>
+          </a:p>
+          <a:p>
+            <a:pPr lvl="1" fontAlgn="auto">
+              <a:lnSpc>
+                <a:spcPct val="150000"/>
+              </a:lnSpc>
+            </a:pPr>
+            <a:r>
+              <a:rPr lang="en-US" altLang="zh-CN" sz="2400"/>
+              <a:t>DL2 + certified training (ART)</a:t>
+            </a:r>
+            <a:endParaRPr lang="zh-CN" altLang="en-US"/>
+          </a:p>
+          <a:p>
+            <a:pPr lvl="1" fontAlgn="auto">
+              <a:lnSpc>
+                <a:spcPct val="150000"/>
+              </a:lnSpc>
+            </a:pPr>
+            <a:r>
+              <a:rPr lang="zh-CN" altLang="en-US"/>
+              <a:t>如何训练？哪种松弛方法更好？</a:t>
+            </a:r>
+            <a:endParaRPr lang="zh-CN" altLang="en-US"/>
+          </a:p>
+          <a:p>
+            <a:pPr lvl="1" fontAlgn="auto">
+              <a:lnSpc>
+                <a:spcPct val="150000"/>
+              </a:lnSpc>
+            </a:pPr>
+            <a:r>
+              <a:rPr lang="zh-CN" altLang="en-US"/>
+              <a:t>用于</a:t>
+            </a:r>
+            <a:r>
+              <a:rPr lang="en-US" altLang="zh-CN"/>
+              <a:t>repair</a:t>
+            </a:r>
+            <a:r>
+              <a:rPr lang="zh-CN" altLang="en-US"/>
+              <a:t>的能力范围（性质数量；和准确率的</a:t>
+            </a:r>
+            <a:r>
+              <a:rPr lang="zh-CN" altLang="en-US"/>
+              <a:t>平衡等）？</a:t>
+            </a:r>
+            <a:endParaRPr lang="zh-CN" altLang="en-US"/>
+          </a:p>
+          <a:p>
+            <a:pPr lvl="1" fontAlgn="auto">
+              <a:lnSpc>
+                <a:spcPct val="150000"/>
+              </a:lnSpc>
+            </a:pPr>
+            <a:r>
+              <a:rPr lang="zh-CN" altLang="en-US"/>
+              <a:t>和别的</a:t>
+            </a:r>
+            <a:r>
+              <a:rPr lang="en-US" altLang="zh-CN"/>
+              <a:t>repair</a:t>
+            </a:r>
+            <a:r>
+              <a:rPr lang="zh-CN" altLang="en-US"/>
+              <a:t>方法的对比</a:t>
+            </a:r>
+            <a:r>
+              <a:rPr lang="en-US" altLang="zh-CN"/>
+              <a:t>(</a:t>
+            </a:r>
+            <a:r>
+              <a:rPr lang="zh-CN" altLang="en-US"/>
+              <a:t>非训练方法</a:t>
+            </a:r>
+            <a:r>
+              <a:rPr lang="en-US" altLang="zh-CN"/>
+              <a:t>)</a:t>
+            </a:r>
+            <a:endParaRPr lang="zh-CN" altLang="en-US"/>
+          </a:p>
+          <a:p>
+            <a:pPr lvl="1" fontAlgn="auto">
+              <a:lnSpc>
+                <a:spcPct val="150000"/>
+              </a:lnSpc>
+            </a:pPr>
+            <a:r>
+              <a:rPr lang="zh-CN" altLang="en-US"/>
+              <a:t>等等</a:t>
+            </a:r>
+            <a:endParaRPr lang="en-US" altLang="zh-CN"/>
+          </a:p>
+          <a:p>
+            <a:pPr lvl="0" fontAlgn="auto">
+              <a:lnSpc>
+                <a:spcPct val="150000"/>
+              </a:lnSpc>
+            </a:pPr>
+            <a:r>
+              <a:rPr lang="en-US" altLang="zh-CN"/>
+              <a:t>Patch</a:t>
+            </a:r>
+            <a:endParaRPr lang="en-US" altLang="zh-CN"/>
+          </a:p>
+          <a:p>
+            <a:pPr lvl="1" fontAlgn="auto">
+              <a:lnSpc>
+                <a:spcPct val="150000"/>
+              </a:lnSpc>
+            </a:pPr>
+            <a:r>
+              <a:rPr lang="zh-CN" altLang="en-US"/>
+              <a:t>由于</a:t>
+            </a:r>
+            <a:r>
+              <a:rPr lang="en-US" altLang="zh-CN"/>
+              <a:t>certified training</a:t>
+            </a:r>
+            <a:r>
+              <a:rPr lang="zh-CN" altLang="en-US"/>
+              <a:t>本身的困难，用于</a:t>
+            </a:r>
+            <a:r>
+              <a:rPr lang="en-US" altLang="zh-CN"/>
+              <a:t>patch</a:t>
+            </a:r>
+            <a:r>
+              <a:rPr lang="zh-CN" altLang="en-US"/>
+              <a:t>的修复不能</a:t>
+            </a:r>
+            <a:r>
+              <a:rPr lang="en-US" altLang="zh-CN"/>
+              <a:t>“</a:t>
+            </a:r>
+            <a:r>
+              <a:rPr lang="zh-CN" altLang="en-US"/>
+              <a:t>囫囵吞枣</a:t>
+            </a:r>
+            <a:r>
+              <a:rPr lang="en-US" altLang="zh-CN"/>
+              <a:t>”</a:t>
+            </a:r>
+            <a:endParaRPr lang="en-US" altLang="zh-CN"/>
+          </a:p>
+        </p:txBody>
+      </p:sp>
+      <p:sp>
+        <p:nvSpPr>
           <p:cNvPr id="3" name="标题 2"/>
           <p:cNvSpPr>
             <a:spLocks noGrp="1"/>
@@ -7781,811 +7982,14 @@
           <a:bodyPr/>
           <a:p>
             <a:r>
-              <a:rPr lang="zh-CN" altLang="en-US" b="0" dirty="0"/>
-              <a:t>How to make indicator enabled</a:t>
-            </a:r>
-            <a:endParaRPr lang="zh-CN" altLang="en-US" b="0" dirty="0"/>
-          </a:p>
-        </p:txBody>
-      </p:sp>
-      <p:sp>
-        <p:nvSpPr>
-          <p:cNvPr id="5" name="流程图: 过程 4"/>
-          <p:cNvSpPr/>
-          <p:nvPr/>
-        </p:nvSpPr>
-        <p:spPr>
-          <a:xfrm>
-            <a:off x="1460500" y="3284855"/>
-            <a:ext cx="1527810" cy="522605"/>
-          </a:xfrm>
-          <a:prstGeom prst="flowChartProcess">
-            <a:avLst/>
-          </a:prstGeom>
-          <a:ln>
-            <a:solidFill>
-              <a:schemeClr val="tx1"/>
-            </a:solidFill>
-          </a:ln>
-        </p:spPr>
-        <p:style>
-          <a:lnRef idx="2">
-            <a:schemeClr val="accent6"/>
-          </a:lnRef>
-          <a:fillRef idx="1">
-            <a:schemeClr val="lt1"/>
-          </a:fillRef>
-          <a:effectRef idx="0">
-            <a:schemeClr val="accent6"/>
-          </a:effectRef>
-          <a:fontRef idx="minor">
-            <a:schemeClr val="dk1"/>
-          </a:fontRef>
-        </p:style>
-        <p:txBody>
-          <a:bodyPr rtlCol="0" anchor="ctr"/>
-          <a:p>
-            <a:pPr algn="ctr"/>
-            <a:r>
-              <a:rPr lang="en-US" altLang="zh-CN">
-                <a:solidFill>
-                  <a:srgbClr val="FF0000"/>
-                </a:solidFill>
-                <a:effectLst>
-                  <a:outerShdw blurRad="38100" dist="19050" dir="2700000" algn="tl" rotWithShape="0">
-                    <a:schemeClr val="dk1">
-                      <a:alpha val="40000"/>
-                    </a:schemeClr>
-                  </a:outerShdw>
-                </a:effectLst>
-              </a:rPr>
-              <a:t>input region</a:t>
-            </a:r>
-            <a:r>
-              <a:rPr lang="en-US" altLang="zh-CN">
-                <a:solidFill>
-                  <a:srgbClr val="FF0000"/>
-                </a:solidFill>
-                <a:effectLst>
-                  <a:outerShdw blurRad="38100" dist="19050" dir="2700000" algn="tl" rotWithShape="0">
-                    <a:schemeClr val="dk1">
-                      <a:alpha val="40000"/>
-                    </a:schemeClr>
-                  </a:outerShdw>
-                </a:effectLst>
-              </a:rPr>
-              <a:t>s</a:t>
-            </a:r>
-            <a:endParaRPr lang="en-US" altLang="zh-CN">
-              <a:solidFill>
-                <a:srgbClr val="FF0000"/>
-              </a:solidFill>
-              <a:effectLst>
-                <a:outerShdw blurRad="38100" dist="19050" dir="2700000" algn="tl" rotWithShape="0">
-                  <a:schemeClr val="dk1">
-                    <a:alpha val="40000"/>
-                  </a:schemeClr>
-                </a:outerShdw>
-              </a:effectLst>
-            </a:endParaRPr>
-          </a:p>
-        </p:txBody>
-      </p:sp>
-      <p:sp>
-        <p:nvSpPr>
-          <p:cNvPr id="7" name="文本框 6"/>
-          <p:cNvSpPr txBox="1"/>
-          <p:nvPr/>
-        </p:nvSpPr>
-        <p:spPr>
-          <a:xfrm>
-            <a:off x="3014980" y="2014220"/>
-            <a:ext cx="886460" cy="306705"/>
-          </a:xfrm>
-          <a:prstGeom prst="rect">
-            <a:avLst/>
-          </a:prstGeom>
-          <a:noFill/>
-        </p:spPr>
-        <p:txBody>
-          <a:bodyPr wrap="square" rtlCol="0">
-            <a:spAutoFit/>
-          </a:bodyPr>
-          <a:p>
-            <a:pPr algn="ctr"/>
-            <a:r>
-              <a:rPr lang="en-US" altLang="zh-CN" sz="1400"/>
-              <a:t>split</a:t>
-            </a:r>
-            <a:endParaRPr lang="en-US" altLang="zh-CN" sz="1400"/>
-          </a:p>
-        </p:txBody>
-      </p:sp>
-      <p:sp>
-        <p:nvSpPr>
-          <p:cNvPr id="8" name="流程图: 过程 7"/>
-          <p:cNvSpPr/>
-          <p:nvPr>
-            <p:custDataLst>
-              <p:tags r:id="rId1"/>
-            </p:custDataLst>
-          </p:nvPr>
-        </p:nvSpPr>
-        <p:spPr>
-          <a:xfrm>
-            <a:off x="4762500" y="1595755"/>
-            <a:ext cx="1111885" cy="624205"/>
-          </a:xfrm>
-          <a:prstGeom prst="flowChartProcess">
-            <a:avLst/>
-          </a:prstGeom>
-          <a:ln>
-            <a:solidFill>
-              <a:schemeClr val="tx1"/>
-            </a:solidFill>
-          </a:ln>
-        </p:spPr>
-        <p:style>
-          <a:lnRef idx="2">
-            <a:schemeClr val="accent6"/>
-          </a:lnRef>
-          <a:fillRef idx="1">
-            <a:schemeClr val="lt1"/>
-          </a:fillRef>
-          <a:effectRef idx="0">
-            <a:schemeClr val="accent6"/>
-          </a:effectRef>
-          <a:fontRef idx="minor">
-            <a:schemeClr val="dk1"/>
-          </a:fontRef>
-        </p:style>
-        <p:txBody>
-          <a:bodyPr rtlCol="0" anchor="ctr"/>
-          <a:p>
-            <a:pPr algn="ctr"/>
-            <a:r>
-              <a:rPr lang="en-US" altLang="zh-CN"/>
-              <a:t>sub </a:t>
-            </a:r>
-            <a:r>
-              <a:rPr lang="en-US" altLang="zh-CN"/>
-              <a:t>region 1</a:t>
-            </a:r>
-            <a:endParaRPr lang="en-US" altLang="zh-CN"/>
-          </a:p>
-        </p:txBody>
-      </p:sp>
-      <p:sp>
-        <p:nvSpPr>
-          <p:cNvPr id="9" name="右箭头 8"/>
-          <p:cNvSpPr/>
-          <p:nvPr>
-            <p:custDataLst>
-              <p:tags r:id="rId2"/>
-            </p:custDataLst>
-          </p:nvPr>
-        </p:nvSpPr>
-        <p:spPr>
-          <a:xfrm>
-            <a:off x="5945505" y="3579495"/>
-            <a:ext cx="1231900" cy="127635"/>
-          </a:xfrm>
-          <a:prstGeom prst="rightArrow">
-            <a:avLst>
-              <a:gd name="adj1" fmla="val 50000"/>
-              <a:gd name="adj2" fmla="val 335323"/>
-            </a:avLst>
-          </a:prstGeom>
-        </p:spPr>
-        <p:style>
-          <a:lnRef idx="2">
-            <a:schemeClr val="accent6"/>
-          </a:lnRef>
-          <a:fillRef idx="1">
-            <a:schemeClr val="lt1"/>
-          </a:fillRef>
-          <a:effectRef idx="0">
-            <a:schemeClr val="accent6"/>
-          </a:effectRef>
-          <a:fontRef idx="minor">
-            <a:schemeClr val="dk1"/>
-          </a:fontRef>
-        </p:style>
-        <p:txBody>
-          <a:bodyPr rtlCol="0" anchor="ctr"/>
-          <a:p>
-            <a:pPr algn="ctr"/>
+              <a:rPr lang="zh-CN" altLang="en-US"/>
+              <a:t>后续</a:t>
+            </a:r>
+            <a:r>
+              <a:rPr lang="zh-CN" altLang="en-US"/>
+              <a:t>工作</a:t>
+            </a:r>
             <a:endParaRPr lang="zh-CN" altLang="en-US"/>
-          </a:p>
-        </p:txBody>
-      </p:sp>
-      <p:sp>
-        <p:nvSpPr>
-          <p:cNvPr id="10" name="文本框 9"/>
-          <p:cNvSpPr txBox="1"/>
-          <p:nvPr>
-            <p:custDataLst>
-              <p:tags r:id="rId3"/>
-            </p:custDataLst>
-          </p:nvPr>
-        </p:nvSpPr>
-        <p:spPr>
-          <a:xfrm>
-            <a:off x="6005195" y="2995295"/>
-            <a:ext cx="1112520" cy="465455"/>
-          </a:xfrm>
-          <a:prstGeom prst="rect">
-            <a:avLst/>
-          </a:prstGeom>
-          <a:noFill/>
-        </p:spPr>
-        <p:txBody>
-          <a:bodyPr wrap="square" rtlCol="0">
-            <a:noAutofit/>
-          </a:bodyPr>
-          <a:p>
-            <a:pPr algn="ctr"/>
-            <a:r>
-              <a:rPr lang="en-US" altLang="zh-CN" sz="1600"/>
-              <a:t>training indicator</a:t>
-            </a:r>
-            <a:endParaRPr lang="en-US" altLang="zh-CN" sz="1600"/>
-          </a:p>
-        </p:txBody>
-      </p:sp>
-      <p:sp>
-        <p:nvSpPr>
-          <p:cNvPr id="12" name="流程图: 过程 11"/>
-          <p:cNvSpPr/>
-          <p:nvPr>
-            <p:custDataLst>
-              <p:tags r:id="rId4"/>
-            </p:custDataLst>
-          </p:nvPr>
-        </p:nvSpPr>
-        <p:spPr>
-          <a:xfrm>
-            <a:off x="7480935" y="3382010"/>
-            <a:ext cx="1527810" cy="522605"/>
-          </a:xfrm>
-          <a:prstGeom prst="flowChartProcess">
-            <a:avLst/>
-          </a:prstGeom>
-          <a:ln>
-            <a:solidFill>
-              <a:schemeClr val="tx1"/>
-            </a:solidFill>
-          </a:ln>
-        </p:spPr>
-        <p:style>
-          <a:lnRef idx="2">
-            <a:schemeClr val="accent6"/>
-          </a:lnRef>
-          <a:fillRef idx="1">
-            <a:schemeClr val="lt1"/>
-          </a:fillRef>
-          <a:effectRef idx="0">
-            <a:schemeClr val="accent6"/>
-          </a:effectRef>
-          <a:fontRef idx="minor">
-            <a:schemeClr val="dk1"/>
-          </a:fontRef>
-        </p:style>
-        <p:txBody>
-          <a:bodyPr rtlCol="0" anchor="ctr"/>
-          <a:p>
-            <a:pPr algn="ctr"/>
-            <a:r>
-              <a:rPr lang="en-US" altLang="zh-CN"/>
-              <a:t>enabled indicator</a:t>
-            </a:r>
-            <a:endParaRPr lang="en-US" altLang="zh-CN"/>
-          </a:p>
-        </p:txBody>
-      </p:sp>
-      <p:sp>
-        <p:nvSpPr>
-          <p:cNvPr id="13" name="右箭头 12"/>
-          <p:cNvSpPr/>
-          <p:nvPr>
-            <p:custDataLst>
-              <p:tags r:id="rId5"/>
-            </p:custDataLst>
-          </p:nvPr>
-        </p:nvSpPr>
-        <p:spPr>
-          <a:xfrm rot="20100000">
-            <a:off x="2905125" y="2454910"/>
-            <a:ext cx="1710055" cy="187960"/>
-          </a:xfrm>
-          <a:prstGeom prst="rightArrow">
-            <a:avLst>
-              <a:gd name="adj1" fmla="val 50000"/>
-              <a:gd name="adj2" fmla="val 335323"/>
-            </a:avLst>
-          </a:prstGeom>
-        </p:spPr>
-        <p:style>
-          <a:lnRef idx="2">
-            <a:schemeClr val="accent6"/>
-          </a:lnRef>
-          <a:fillRef idx="1">
-            <a:schemeClr val="lt1"/>
-          </a:fillRef>
-          <a:effectRef idx="0">
-            <a:schemeClr val="accent6"/>
-          </a:effectRef>
-          <a:fontRef idx="minor">
-            <a:schemeClr val="dk1"/>
-          </a:fontRef>
-        </p:style>
-        <p:txBody>
-          <a:bodyPr rtlCol="0" anchor="ctr"/>
-          <a:p>
-            <a:pPr algn="ctr"/>
-            <a:endParaRPr lang="zh-CN" altLang="en-US"/>
-          </a:p>
-        </p:txBody>
-      </p:sp>
-      <p:sp>
-        <p:nvSpPr>
-          <p:cNvPr id="4" name="流程图: 过程 3"/>
-          <p:cNvSpPr/>
-          <p:nvPr>
-            <p:custDataLst>
-              <p:tags r:id="rId6"/>
-            </p:custDataLst>
-          </p:nvPr>
-        </p:nvSpPr>
-        <p:spPr>
-          <a:xfrm>
-            <a:off x="4762500" y="2336165"/>
-            <a:ext cx="1111885" cy="607695"/>
-          </a:xfrm>
-          <a:prstGeom prst="flowChartProcess">
-            <a:avLst/>
-          </a:prstGeom>
-          <a:ln>
-            <a:solidFill>
-              <a:schemeClr val="tx1"/>
-            </a:solidFill>
-          </a:ln>
-        </p:spPr>
-        <p:style>
-          <a:lnRef idx="2">
-            <a:schemeClr val="accent6"/>
-          </a:lnRef>
-          <a:fillRef idx="1">
-            <a:schemeClr val="lt1"/>
-          </a:fillRef>
-          <a:effectRef idx="0">
-            <a:schemeClr val="accent6"/>
-          </a:effectRef>
-          <a:fontRef idx="minor">
-            <a:schemeClr val="dk1"/>
-          </a:fontRef>
-        </p:style>
-        <p:txBody>
-          <a:bodyPr rtlCol="0" anchor="ctr"/>
-          <a:p>
-            <a:pPr algn="ctr"/>
-            <a:r>
-              <a:rPr lang="en-US" altLang="zh-CN"/>
-              <a:t>sub</a:t>
-            </a:r>
-            <a:endParaRPr lang="en-US" altLang="zh-CN"/>
-          </a:p>
-          <a:p>
-            <a:pPr algn="ctr"/>
-            <a:r>
-              <a:rPr lang="en-US" altLang="zh-CN"/>
-              <a:t>region 2</a:t>
-            </a:r>
-            <a:endParaRPr lang="en-US" altLang="zh-CN"/>
-          </a:p>
-        </p:txBody>
-      </p:sp>
-      <p:sp>
-        <p:nvSpPr>
-          <p:cNvPr id="6" name="左大括号 5"/>
-          <p:cNvSpPr/>
-          <p:nvPr/>
-        </p:nvSpPr>
-        <p:spPr>
-          <a:xfrm>
-            <a:off x="3216910" y="3086100"/>
-            <a:ext cx="586105" cy="1073785"/>
-          </a:xfrm>
-          <a:prstGeom prst="leftBrace">
-            <a:avLst/>
-          </a:prstGeom>
-        </p:spPr>
-        <p:style>
-          <a:lnRef idx="3">
-            <a:schemeClr val="accent1"/>
-          </a:lnRef>
-          <a:fillRef idx="0">
-            <a:schemeClr val="accent1"/>
-          </a:fillRef>
-          <a:effectRef idx="2">
-            <a:schemeClr val="accent1"/>
-          </a:effectRef>
-          <a:fontRef idx="minor">
-            <a:schemeClr val="tx1"/>
-          </a:fontRef>
-        </p:style>
-        <p:txBody>
-          <a:bodyPr rtlCol="0" anchor="ctr"/>
-          <a:p>
-            <a:pPr algn="ctr"/>
-            <a:endParaRPr lang="zh-CN" altLang="en-US"/>
-          </a:p>
-        </p:txBody>
-      </p:sp>
-      <p:sp>
-        <p:nvSpPr>
-          <p:cNvPr id="14" name="文本框 13"/>
-          <p:cNvSpPr txBox="1"/>
-          <p:nvPr/>
-        </p:nvSpPr>
-        <p:spPr>
-          <a:xfrm>
-            <a:off x="3901440" y="3162300"/>
-            <a:ext cx="1759585" cy="645160"/>
-          </a:xfrm>
-          <a:prstGeom prst="rect">
-            <a:avLst/>
-          </a:prstGeom>
-          <a:noFill/>
-        </p:spPr>
-        <p:txBody>
-          <a:bodyPr wrap="square" rtlCol="0">
-            <a:spAutoFit/>
-          </a:bodyPr>
-          <a:p>
-            <a:endParaRPr lang="en-US" altLang="zh-CN"/>
-          </a:p>
-          <a:p>
-            <a:r>
-              <a:rPr lang="en-US" altLang="zh-CN"/>
-              <a:t>which property</a:t>
-            </a:r>
-            <a:endParaRPr lang="en-US" altLang="zh-CN"/>
-          </a:p>
-        </p:txBody>
-      </p:sp>
-      <p:sp>
-        <p:nvSpPr>
-          <p:cNvPr id="15" name="左大括号 14"/>
-          <p:cNvSpPr/>
-          <p:nvPr/>
-        </p:nvSpPr>
-        <p:spPr>
-          <a:xfrm>
-            <a:off x="9371330" y="3105785"/>
-            <a:ext cx="586105" cy="1073785"/>
-          </a:xfrm>
-          <a:prstGeom prst="leftBrace">
-            <a:avLst/>
-          </a:prstGeom>
-        </p:spPr>
-        <p:style>
-          <a:lnRef idx="3">
-            <a:schemeClr val="accent1"/>
-          </a:lnRef>
-          <a:fillRef idx="0">
-            <a:schemeClr val="accent1"/>
-          </a:fillRef>
-          <a:effectRef idx="2">
-            <a:schemeClr val="accent1"/>
-          </a:effectRef>
-          <a:fontRef idx="minor">
-            <a:schemeClr val="tx1"/>
-          </a:fontRef>
-        </p:style>
-        <p:txBody>
-          <a:bodyPr rtlCol="0" anchor="ctr"/>
-          <a:p>
-            <a:pPr algn="ctr"/>
-            <a:endParaRPr lang="zh-CN" altLang="en-US"/>
-          </a:p>
-        </p:txBody>
-      </p:sp>
-      <p:sp>
-        <p:nvSpPr>
-          <p:cNvPr id="16" name="文本框 15"/>
-          <p:cNvSpPr txBox="1"/>
-          <p:nvPr/>
-        </p:nvSpPr>
-        <p:spPr>
-          <a:xfrm>
-            <a:off x="10026650" y="3182620"/>
-            <a:ext cx="1759585" cy="922020"/>
-          </a:xfrm>
-          <a:prstGeom prst="rect">
-            <a:avLst/>
-          </a:prstGeom>
-          <a:noFill/>
-        </p:spPr>
-        <p:txBody>
-          <a:bodyPr wrap="square" rtlCol="0">
-            <a:spAutoFit/>
-          </a:bodyPr>
-          <a:p>
-            <a:r>
-              <a:rPr lang="en-US" altLang="zh-CN"/>
-              <a:t>the input region</a:t>
-            </a:r>
-            <a:endParaRPr lang="en-US" altLang="zh-CN"/>
-          </a:p>
-          <a:p>
-            <a:r>
-              <a:rPr lang="en-US" altLang="zh-CN"/>
-              <a:t>belongs to </a:t>
-            </a:r>
-            <a:r>
-              <a:rPr lang="en-US" altLang="zh-CN">
-                <a:sym typeface="+mn-ea"/>
-              </a:rPr>
-              <a:t>which property</a:t>
-            </a:r>
-            <a:endParaRPr lang="en-US" altLang="zh-CN"/>
-          </a:p>
-        </p:txBody>
-      </p:sp>
-      <p:sp>
-        <p:nvSpPr>
-          <p:cNvPr id="17" name="右箭头 16"/>
-          <p:cNvSpPr/>
-          <p:nvPr>
-            <p:custDataLst>
-              <p:tags r:id="rId7"/>
-            </p:custDataLst>
-          </p:nvPr>
-        </p:nvSpPr>
-        <p:spPr>
-          <a:xfrm rot="16200000">
-            <a:off x="7918450" y="2914015"/>
-            <a:ext cx="652145" cy="90805"/>
-          </a:xfrm>
-          <a:prstGeom prst="rightArrow">
-            <a:avLst>
-              <a:gd name="adj1" fmla="val 50000"/>
-              <a:gd name="adj2" fmla="val 335323"/>
-            </a:avLst>
-          </a:prstGeom>
-        </p:spPr>
-        <p:style>
-          <a:lnRef idx="2">
-            <a:schemeClr val="accent6"/>
-          </a:lnRef>
-          <a:fillRef idx="1">
-            <a:schemeClr val="lt1"/>
-          </a:fillRef>
-          <a:effectRef idx="0">
-            <a:schemeClr val="accent6"/>
-          </a:effectRef>
-          <a:fontRef idx="minor">
-            <a:schemeClr val="dk1"/>
-          </a:fontRef>
-        </p:style>
-        <p:txBody>
-          <a:bodyPr rtlCol="0" anchor="ctr"/>
-          <a:p>
-            <a:pPr algn="ctr"/>
-            <a:endParaRPr lang="zh-CN" altLang="en-US"/>
-          </a:p>
-        </p:txBody>
-      </p:sp>
-      <p:sp>
-        <p:nvSpPr>
-          <p:cNvPr id="18" name="文本框 17"/>
-          <p:cNvSpPr txBox="1"/>
-          <p:nvPr>
-            <p:custDataLst>
-              <p:tags r:id="rId8"/>
-            </p:custDataLst>
-          </p:nvPr>
-        </p:nvSpPr>
-        <p:spPr>
-          <a:xfrm>
-            <a:off x="8392160" y="2696845"/>
-            <a:ext cx="1342390" cy="465455"/>
-          </a:xfrm>
-          <a:prstGeom prst="rect">
-            <a:avLst/>
-          </a:prstGeom>
-          <a:noFill/>
-        </p:spPr>
-        <p:txBody>
-          <a:bodyPr wrap="square" rtlCol="0">
-            <a:noAutofit/>
-          </a:bodyPr>
-          <a:p>
-            <a:pPr algn="ctr"/>
-            <a:r>
-              <a:rPr lang="en-US" altLang="zh-CN" sz="1200"/>
-              <a:t>combine with patch</a:t>
-            </a:r>
-            <a:r>
-              <a:rPr lang="en-US" altLang="zh-CN" sz="1200"/>
-              <a:t> and NN</a:t>
-            </a:r>
-            <a:endParaRPr lang="en-US" altLang="zh-CN" sz="1200"/>
-          </a:p>
-        </p:txBody>
-      </p:sp>
-      <p:pic>
-        <p:nvPicPr>
-          <p:cNvPr id="19" name="图片 18"/>
-          <p:cNvPicPr>
-            <a:picLocks noChangeAspect="1"/>
-          </p:cNvPicPr>
-          <p:nvPr/>
-        </p:nvPicPr>
-        <p:blipFill>
-          <a:blip r:embed="rId9"/>
-          <a:stretch>
-            <a:fillRect/>
-          </a:stretch>
-        </p:blipFill>
-        <p:spPr>
-          <a:xfrm>
-            <a:off x="1751965" y="4749800"/>
-            <a:ext cx="9618980" cy="1266825"/>
-          </a:xfrm>
-          <a:prstGeom prst="rect">
-            <a:avLst/>
-          </a:prstGeom>
-        </p:spPr>
-      </p:pic>
-      <p:sp>
-        <p:nvSpPr>
-          <p:cNvPr id="20" name="流程图: 过程 19"/>
-          <p:cNvSpPr/>
-          <p:nvPr>
-            <p:custDataLst>
-              <p:tags r:id="rId10"/>
-            </p:custDataLst>
-          </p:nvPr>
-        </p:nvSpPr>
-        <p:spPr>
-          <a:xfrm>
-            <a:off x="7480300" y="2014220"/>
-            <a:ext cx="1527810" cy="522605"/>
-          </a:xfrm>
-          <a:prstGeom prst="flowChartProcess">
-            <a:avLst/>
-          </a:prstGeom>
-          <a:ln>
-            <a:solidFill>
-              <a:schemeClr val="tx1"/>
-            </a:solidFill>
-          </a:ln>
-        </p:spPr>
-        <p:style>
-          <a:lnRef idx="2">
-            <a:schemeClr val="accent6"/>
-          </a:lnRef>
-          <a:fillRef idx="1">
-            <a:schemeClr val="lt1"/>
-          </a:fillRef>
-          <a:effectRef idx="0">
-            <a:schemeClr val="accent6"/>
-          </a:effectRef>
-          <a:fontRef idx="minor">
-            <a:schemeClr val="dk1"/>
-          </a:fontRef>
-        </p:style>
-        <p:txBody>
-          <a:bodyPr rtlCol="0" anchor="ctr"/>
-          <a:p>
-            <a:pPr algn="ctr"/>
-            <a:r>
-              <a:rPr lang="en-US" altLang="zh-CN">
-                <a:solidFill>
-                  <a:schemeClr val="accent1"/>
-                </a:solidFill>
-                <a:effectLst>
-                  <a:outerShdw blurRad="38100" dist="25400" dir="5400000" algn="ctr" rotWithShape="0">
-                    <a:srgbClr val="6E747A">
-                      <a:alpha val="43000"/>
-                    </a:srgbClr>
-                  </a:outerShdw>
-                </a:effectLst>
-              </a:rPr>
-              <a:t>repaired NN’</a:t>
-            </a:r>
-            <a:endParaRPr lang="en-US" altLang="zh-CN">
-              <a:solidFill>
-                <a:schemeClr val="accent1"/>
-              </a:solidFill>
-              <a:effectLst>
-                <a:outerShdw blurRad="38100" dist="25400" dir="5400000" algn="ctr" rotWithShape="0">
-                  <a:srgbClr val="6E747A">
-                    <a:alpha val="43000"/>
-                  </a:srgbClr>
-                </a:outerShdw>
-              </a:effectLst>
-            </a:endParaRPr>
-          </a:p>
-        </p:txBody>
-      </p:sp>
-      <p:sp>
-        <p:nvSpPr>
-          <p:cNvPr id="2" name="右箭头 1"/>
-          <p:cNvSpPr/>
-          <p:nvPr>
-            <p:custDataLst>
-              <p:tags r:id="rId11"/>
-            </p:custDataLst>
-          </p:nvPr>
-        </p:nvSpPr>
-        <p:spPr>
-          <a:xfrm>
-            <a:off x="6061710" y="2193290"/>
-            <a:ext cx="1231900" cy="127635"/>
-          </a:xfrm>
-          <a:prstGeom prst="rightArrow">
-            <a:avLst>
-              <a:gd name="adj1" fmla="val 50000"/>
-              <a:gd name="adj2" fmla="val 335323"/>
-            </a:avLst>
-          </a:prstGeom>
-        </p:spPr>
-        <p:style>
-          <a:lnRef idx="2">
-            <a:schemeClr val="accent6"/>
-          </a:lnRef>
-          <a:fillRef idx="1">
-            <a:schemeClr val="lt1"/>
-          </a:fillRef>
-          <a:effectRef idx="0">
-            <a:schemeClr val="accent6"/>
-          </a:effectRef>
-          <a:fontRef idx="minor">
-            <a:schemeClr val="dk1"/>
-          </a:fontRef>
-        </p:style>
-        <p:txBody>
-          <a:bodyPr rtlCol="0" anchor="ctr"/>
-          <a:p>
-            <a:pPr algn="ctr"/>
-            <a:endParaRPr lang="zh-CN" altLang="en-US"/>
-          </a:p>
-        </p:txBody>
-      </p:sp>
-      <p:sp>
-        <p:nvSpPr>
-          <p:cNvPr id="11" name="文本框 10"/>
-          <p:cNvSpPr txBox="1"/>
-          <p:nvPr>
-            <p:custDataLst>
-              <p:tags r:id="rId12"/>
-            </p:custDataLst>
-          </p:nvPr>
-        </p:nvSpPr>
-        <p:spPr>
-          <a:xfrm>
-            <a:off x="6005195" y="1675130"/>
-            <a:ext cx="1112520" cy="465455"/>
-          </a:xfrm>
-          <a:prstGeom prst="rect">
-            <a:avLst/>
-          </a:prstGeom>
-          <a:noFill/>
-        </p:spPr>
-        <p:txBody>
-          <a:bodyPr wrap="square" rtlCol="0">
-            <a:noAutofit/>
-          </a:bodyPr>
-          <a:p>
-            <a:pPr algn="ctr"/>
-            <a:r>
-              <a:rPr lang="en-US" altLang="zh-CN" sz="1600"/>
-              <a:t>training </a:t>
-            </a:r>
-            <a:endParaRPr lang="en-US" altLang="zh-CN" sz="1600"/>
           </a:p>
         </p:txBody>
       </p:sp>
@@ -10076,7 +9480,11 @@
             </a:pPr>
             <a:r>
               <a:rPr lang="zh-CN" altLang="en-US"/>
-              <a:t>前者求得的最小值无法有</a:t>
+              <a:t>前者求得的最小值</a:t>
+            </a:r>
+            <a:r>
+              <a:rPr lang="zh-CN" altLang="en-US"/>
+              <a:t>没有</a:t>
             </a:r>
             <a:r>
               <a:rPr lang="en-US" altLang="zh-CN"/>
@@ -10329,6 +9737,39 @@
           </a:p>
         </p:txBody>
       </p:sp>
+      <p:sp>
+        <p:nvSpPr>
+          <p:cNvPr id="11" name="文本框 10"/>
+          <p:cNvSpPr txBox="1"/>
+          <p:nvPr>
+            <p:custDataLst>
+              <p:tags r:id="rId4"/>
+            </p:custDataLst>
+          </p:nvPr>
+        </p:nvSpPr>
+        <p:spPr>
+          <a:xfrm>
+            <a:off x="269875" y="6350000"/>
+            <a:ext cx="11155680" cy="340995"/>
+          </a:xfrm>
+          <a:prstGeom prst="rect">
+            <a:avLst/>
+          </a:prstGeom>
+          <a:noFill/>
+        </p:spPr>
+        <p:txBody>
+          <a:bodyPr wrap="square" rtlCol="0">
+            <a:noAutofit/>
+          </a:bodyPr>
+          <a:p>
+            <a:r>
+              <a:rPr lang="en-US" sz="1200"/>
+              <a:t>From https://files.sri.inf.ethz.ch/website/teaching/reliableai2022/materials/lectures/LECTURE5_CERTIFIED_TRAINING.pdf</a:t>
+            </a:r>
+            <a:endParaRPr lang="en-US" sz="1200"/>
+          </a:p>
+        </p:txBody>
+      </p:sp>
     </p:spTree>
   </p:cSld>
   <p:clrMapOvr>
@@ -10416,6 +9857,39 @@
           </a:prstGeom>
         </p:spPr>
       </p:pic>
+      <p:sp>
+        <p:nvSpPr>
+          <p:cNvPr id="11" name="文本框 10"/>
+          <p:cNvSpPr txBox="1"/>
+          <p:nvPr>
+            <p:custDataLst>
+              <p:tags r:id="rId4"/>
+            </p:custDataLst>
+          </p:nvPr>
+        </p:nvSpPr>
+        <p:spPr>
+          <a:xfrm>
+            <a:off x="233680" y="6350000"/>
+            <a:ext cx="11155680" cy="340995"/>
+          </a:xfrm>
+          <a:prstGeom prst="rect">
+            <a:avLst/>
+          </a:prstGeom>
+          <a:noFill/>
+        </p:spPr>
+        <p:txBody>
+          <a:bodyPr wrap="square" rtlCol="0">
+            <a:noAutofit/>
+          </a:bodyPr>
+          <a:p>
+            <a:r>
+              <a:rPr lang="en-US" sz="1200"/>
+              <a:t>From https://files.sri.inf.ethz.ch/website/teaching/reliableai2022/materials/lectures/LECTURE5_CERTIFIED_TRAINING.pdf</a:t>
+            </a:r>
+            <a:endParaRPr lang="en-US" sz="1200"/>
+          </a:p>
+        </p:txBody>
+      </p:sp>
     </p:spTree>
   </p:cSld>
   <p:clrMapOvr>
@@ -11784,7 +11258,11 @@
           <a:p>
             <a:r>
               <a:rPr lang="en-US" altLang="zh-CN" sz="2000"/>
-              <a:t>DL2: Training and Querying Neural Networks with Logic (PMLR 2019)</a:t>
+              <a:t>DL2: Training and Querying Neural Networks with Logic (</a:t>
+            </a:r>
+            <a:r>
+              <a:rPr lang="en-US" altLang="zh-CN" sz="2000"/>
+              <a:t>ICML 2019)</a:t>
             </a:r>
             <a:endParaRPr lang="en-US" altLang="zh-CN" sz="2000"/>
           </a:p>
@@ -11933,46 +11411,6 @@
             <a:endParaRPr lang="zh-CN" altLang="en-US" sz="2000"/>
           </a:p>
           <a:p>
-            <a:pPr fontAlgn="auto">
-              <a:lnSpc>
-                <a:spcPct val="150000"/>
-              </a:lnSpc>
-            </a:pPr>
-            <a:r>
-              <a:rPr lang="zh-CN" altLang="en-US" sz="2000"/>
-              <a:t>实际：</a:t>
-            </a:r>
-            <a:r>
-              <a:rPr lang="en-US" altLang="zh-CN" sz="2000"/>
-              <a:t>box/IBP</a:t>
-            </a:r>
-            <a:r>
-              <a:rPr lang="zh-CN" altLang="en-US" sz="2000"/>
-              <a:t>效果最好</a:t>
-            </a:r>
-            <a:endParaRPr lang="zh-CN" altLang="en-US" sz="2000"/>
-          </a:p>
-          <a:p>
-            <a:pPr lvl="1" fontAlgn="auto">
-              <a:lnSpc>
-                <a:spcPct val="150000"/>
-              </a:lnSpc>
-            </a:pPr>
-            <a:r>
-              <a:rPr lang="en-US" altLang="zh-CN" sz="2000"/>
-              <a:t>over-regularization</a:t>
-            </a:r>
-            <a:r>
-              <a:rPr lang="zh-CN" altLang="en-US" sz="2000"/>
-              <a:t>，让网络退化；尤其是大的</a:t>
-            </a:r>
-            <a:r>
-              <a:rPr lang="en-US" altLang="zh-CN" sz="2000"/>
-              <a:t> radius</a:t>
-            </a:r>
-            <a:endParaRPr lang="en-US" altLang="zh-CN" sz="2000"/>
-          </a:p>
-          <a:p>
             <a:pPr marL="0" indent="0">
               <a:buNone/>
             </a:pPr>
@@ -12109,30 +11547,168 @@
           <a:lstStyle/>
           <a:p>
             <a:r>
-              <a:rPr lang="en-US" altLang="zh-CN" b="0" dirty="0"/>
-              <a:t>Continuity and S</a:t>
-            </a:r>
-            <a:r>
-              <a:rPr lang="en-US" altLang="zh-CN" b="0" dirty="0"/>
-              <a:t>ensitivity</a:t>
-            </a:r>
-            <a:endParaRPr lang="en-US" altLang="zh-CN" b="0" dirty="0"/>
+              <a:rPr lang="zh-CN" altLang="en-US" b="0" dirty="0"/>
+              <a:t>松弛</a:t>
+            </a:r>
+            <a:r>
+              <a:rPr lang="zh-CN" altLang="en-US" b="0" dirty="0"/>
+              <a:t>选择</a:t>
+            </a:r>
+            <a:endParaRPr lang="zh-CN" altLang="en-US" b="0" dirty="0"/>
           </a:p>
         </p:txBody>
       </p:sp>
       <p:sp>
         <p:nvSpPr>
-          <p:cNvPr id="11" name="文本框 10"/>
-          <p:cNvSpPr txBox="1"/>
+          <p:cNvPr id="3" name="内容占位符 2"/>
+          <p:cNvSpPr/>
+          <p:nvPr>
+            <p:ph idx="1"/>
+          </p:nvPr>
+        </p:nvSpPr>
+        <p:spPr>
+          <a:xfrm>
+            <a:off x="838200" y="1340485"/>
+            <a:ext cx="5970270" cy="5061585"/>
+          </a:xfrm>
+        </p:spPr>
+        <p:txBody>
+          <a:bodyPr/>
+          <a:p>
+            <a:pPr fontAlgn="auto">
+              <a:lnSpc>
+                <a:spcPct val="150000"/>
+              </a:lnSpc>
+            </a:pPr>
+            <a:r>
+              <a:rPr lang="zh-CN" altLang="en-US" sz="2000"/>
+              <a:t>直观上：越紧的松弛效果越好</a:t>
+            </a:r>
+            <a:endParaRPr lang="zh-CN" altLang="en-US" sz="2000"/>
+          </a:p>
+          <a:p>
+            <a:pPr lvl="1" fontAlgn="auto">
+              <a:lnSpc>
+                <a:spcPct val="150000"/>
+              </a:lnSpc>
+            </a:pPr>
+            <a:r>
+              <a:rPr lang="zh-CN" altLang="en-US" sz="2000"/>
+              <a:t>松弛太松可能会导致训练不稳定</a:t>
+            </a:r>
+            <a:endParaRPr lang="zh-CN" altLang="en-US" sz="2000"/>
+          </a:p>
+          <a:p>
+            <a:pPr lvl="1" fontAlgn="auto">
+              <a:lnSpc>
+                <a:spcPct val="150000"/>
+              </a:lnSpc>
+            </a:pPr>
+            <a:r>
+              <a:rPr lang="zh-CN" altLang="en-US" sz="2000"/>
+              <a:t>包含</a:t>
+            </a:r>
+            <a:r>
+              <a:rPr lang="zh-CN" altLang="en-US" sz="2000"/>
+              <a:t>的不可行点会少</a:t>
+            </a:r>
+            <a:endParaRPr lang="zh-CN" altLang="en-US" sz="2000"/>
+          </a:p>
+          <a:p>
+            <a:pPr fontAlgn="auto">
+              <a:lnSpc>
+                <a:spcPct val="150000"/>
+              </a:lnSpc>
+            </a:pPr>
+            <a:r>
+              <a:rPr lang="zh-CN" altLang="en-US" sz="2000"/>
+              <a:t>实际：</a:t>
+            </a:r>
+            <a:r>
+              <a:rPr lang="en-US" altLang="zh-CN" sz="2000"/>
+              <a:t>box/IBP</a:t>
+            </a:r>
+            <a:r>
+              <a:rPr lang="zh-CN" altLang="en-US" sz="2000"/>
+              <a:t>效果最好</a:t>
+            </a:r>
+            <a:endParaRPr lang="zh-CN" altLang="en-US" sz="2000"/>
+          </a:p>
+          <a:p>
+            <a:pPr lvl="1" fontAlgn="auto">
+              <a:lnSpc>
+                <a:spcPct val="150000"/>
+              </a:lnSpc>
+            </a:pPr>
+            <a:r>
+              <a:rPr lang="en-US" altLang="zh-CN" sz="2000"/>
+              <a:t>over-regularization</a:t>
+            </a:r>
+            <a:r>
+              <a:rPr lang="zh-CN" altLang="en-US" sz="2000"/>
+              <a:t>，让网络退化；尤其是大的</a:t>
+            </a:r>
+            <a:r>
+              <a:rPr lang="en-US" altLang="zh-CN" sz="2000"/>
+              <a:t> radius</a:t>
+            </a:r>
+            <a:endParaRPr lang="en-US" altLang="zh-CN" sz="2000"/>
+          </a:p>
+          <a:p>
+            <a:pPr marL="0" indent="0">
+              <a:buNone/>
+            </a:pPr>
+            <a:endParaRPr lang="zh-CN" altLang="en-US"/>
+          </a:p>
+          <a:p>
+            <a:pPr marL="0" indent="0">
+              <a:buNone/>
+            </a:pPr>
+            <a:endParaRPr lang="zh-CN" altLang="en-US"/>
+          </a:p>
+        </p:txBody>
+      </p:sp>
+      <p:pic>
+        <p:nvPicPr>
+          <p:cNvPr id="5" name="图片 4"/>
+          <p:cNvPicPr>
+            <a:picLocks noChangeAspect="1"/>
+          </p:cNvPicPr>
           <p:nvPr>
             <p:custDataLst>
               <p:tags r:id="rId1"/>
             </p:custDataLst>
           </p:nvPr>
-        </p:nvSpPr>
+        </p:nvPicPr>
+        <p:blipFill>
+          <a:blip r:embed="rId2"/>
+          <a:stretch>
+            <a:fillRect/>
+          </a:stretch>
+        </p:blipFill>
         <p:spPr>
           <a:xfrm>
-            <a:off x="407035" y="5713095"/>
+            <a:off x="6808470" y="1021715"/>
+            <a:ext cx="4451985" cy="4832985"/>
+          </a:xfrm>
+          <a:prstGeom prst="rect">
+            <a:avLst/>
+          </a:prstGeom>
+        </p:spPr>
+      </p:pic>
+      <p:sp>
+        <p:nvSpPr>
+          <p:cNvPr id="11" name="文本框 10"/>
+          <p:cNvSpPr txBox="1"/>
+          <p:nvPr>
+            <p:custDataLst>
+              <p:tags r:id="rId3"/>
+            </p:custDataLst>
+          </p:nvPr>
+        </p:nvSpPr>
+        <p:spPr>
+          <a:xfrm>
+            <a:off x="521335" y="5812790"/>
             <a:ext cx="11378565" cy="686435"/>
           </a:xfrm>
           <a:prstGeom prst="rect">
@@ -12147,40 +11723,28 @@
           <a:p>
             <a:r>
               <a:rPr sz="1600"/>
-              <a:t>N. Jovanovi ́c, M. Balunovi ́c, M. Baader, and M. Vechev, "On the paradox of certified training," in Transactions on Machine Learning Research, 2022.</a:t>
+              <a:t>H</a:t>
+            </a:r>
+            <a:r>
+              <a:rPr lang="en-US" sz="1600"/>
+              <a:t>.</a:t>
+            </a:r>
+            <a:r>
+              <a:rPr sz="1600"/>
+              <a:t> Zhang</a:t>
+            </a:r>
+            <a:r>
+              <a:rPr lang="en-US" sz="1600"/>
+              <a:t>,</a:t>
+            </a:r>
+            <a:r>
+              <a:rPr sz="1600"/>
+              <a:t> Towards stable and efficient training of verifiably robust neural networks. In International Conference on Learning Representations, 2020.</a:t>
             </a:r>
             <a:endParaRPr sz="1600"/>
           </a:p>
         </p:txBody>
       </p:sp>
-      <p:pic>
-        <p:nvPicPr>
-          <p:cNvPr id="4" name="图片 3"/>
-          <p:cNvPicPr>
-            <a:picLocks noChangeAspect="1"/>
-          </p:cNvPicPr>
-          <p:nvPr>
-            <p:custDataLst>
-              <p:tags r:id="rId2"/>
-            </p:custDataLst>
-          </p:nvPr>
-        </p:nvPicPr>
-        <p:blipFill>
-          <a:blip r:embed="rId3"/>
-          <a:stretch>
-            <a:fillRect/>
-          </a:stretch>
-        </p:blipFill>
-        <p:spPr>
-          <a:xfrm>
-            <a:off x="1036320" y="1408430"/>
-            <a:ext cx="10191115" cy="4114165"/>
-          </a:xfrm>
-          <a:prstGeom prst="rect">
-            <a:avLst/>
-          </a:prstGeom>
-        </p:spPr>
-      </p:pic>
     </p:spTree>
   </p:cSld>
   <p:clrMapOvr>
@@ -12281,7 +11845,7 @@
 
 <file path=ppt/tags/tag23.xml><?xml version="1.0" encoding="utf-8"?>
 <p:tagLst xmlns:p="http://schemas.openxmlformats.org/presentationml/2006/main">
-  <p:tag name="KSO_WM_UNIT_TABLE_BEAUTIFY" val="smartTable{78d83743-3def-4133-908e-2525dfca33e6}"/>
+  <p:tag name="KSO_WM_BEAUTIFY_FLAG" val=""/>
 </p:tagLst>
 </file>
 
@@ -12340,24 +11904,6 @@
 </file>
 
 <file path=ppt/tags/tag32.xml><?xml version="1.0" encoding="utf-8"?>
-<p:tagLst xmlns:p="http://schemas.openxmlformats.org/presentationml/2006/main">
-  <p:tag name="KSO_WM_BEAUTIFY_FLAG" val=""/>
-</p:tagLst>
-</file>
-
-<file path=ppt/tags/tag33.xml><?xml version="1.0" encoding="utf-8"?>
-<p:tagLst xmlns:p="http://schemas.openxmlformats.org/presentationml/2006/main">
-  <p:tag name="KSO_WM_BEAUTIFY_FLAG" val=""/>
-</p:tagLst>
-</file>
-
-<file path=ppt/tags/tag34.xml><?xml version="1.0" encoding="utf-8"?>
-<p:tagLst xmlns:p="http://schemas.openxmlformats.org/presentationml/2006/main">
-  <p:tag name="KSO_WM_BEAUTIFY_FLAG" val=""/>
-</p:tagLst>
-</file>
-
-<file path=ppt/tags/tag35.xml><?xml version="1.0" encoding="utf-8"?>
 <p:tagLst xmlns:p="http://schemas.openxmlformats.org/presentationml/2006/main">
   <p:tag name="KSO_WPP_MARK_KEY" val="c0f8c1c7-ef60-4d72-9b76-f7734bae5e8a"/>
   <p:tag name="COMMONDATA" val="eyJoZGlkIjoiYzNjMDY0NjEyOGM4YjM5OTYwM2FjNTY4ZTE2YzY5YTEifQ=="/>

</xml_diff>